<commit_message>
Arquivos do Projeto (Backup)
</commit_message>
<xml_diff>
--- a/Documentos/Status Report/StatusReport-semana1.pptx
+++ b/Documentos/Status Report/StatusReport-semana1.pptx
@@ -7,15 +7,14 @@
     <p:sldMasterId id="2147483665" r:id="rId6"/>
   </p:sldMasterIdLst>
   <p:notesMasterIdLst>
-    <p:notesMasterId r:id="rId10"/>
+    <p:notesMasterId r:id="rId9"/>
   </p:notesMasterIdLst>
   <p:handoutMasterIdLst>
-    <p:handoutMasterId r:id="rId11"/>
+    <p:handoutMasterId r:id="rId10"/>
   </p:handoutMasterIdLst>
   <p:sldIdLst>
-    <p:sldId id="256" r:id="rId7"/>
-    <p:sldId id="344" r:id="rId8"/>
-    <p:sldId id="471" r:id="rId9"/>
+    <p:sldId id="472" r:id="rId7"/>
+    <p:sldId id="471" r:id="rId8"/>
   </p:sldIdLst>
   <p:sldSz cx="13442950" cy="7561263"/>
   <p:notesSz cx="7104063" cy="10234613"/>
@@ -118,13 +117,11 @@
     <p:ext uri="{521415D9-36F7-43E2-AB2F-B90AF26B5E84}">
       <p14:sectionLst xmlns:p14="http://schemas.microsoft.com/office/powerpoint/2010/main">
         <p14:section name="Seção Padrão" id="{518A6DE0-5A07-4B92-AB0B-CBE40F1E12B0}">
-          <p14:sldIdLst>
-            <p14:sldId id="256"/>
-          </p14:sldIdLst>
+          <p14:sldIdLst/>
         </p14:section>
         <p14:section name="Seção sem Título" id="{B25D74AB-31B5-4A84-9E5B-036A4CD24A72}">
           <p14:sldIdLst>
-            <p14:sldId id="344"/>
+            <p14:sldId id="472"/>
             <p14:sldId id="471"/>
           </p14:sldIdLst>
         </p14:section>
@@ -151,9 +148,83 @@
 <file path=ppt/revisionInfo.xml><?xml version="1.0" encoding="utf-8"?>
 <p1510:revInfo xmlns:a="http://schemas.openxmlformats.org/drawingml/2006/main" xmlns:r="http://schemas.openxmlformats.org/officeDocument/2006/relationships" xmlns:p1510="http://schemas.microsoft.com/office/powerpoint/2015/10/main">
   <p1510:revLst>
-    <p1510:client id="{6220134B-F3B8-4085-9C84-2D7806280F35}" v="1" dt="2021-08-11T18:37:50.042"/>
+    <p1510:client id="{5DFB136F-8639-484B-A90B-1BA63F4E797E}" v="1" dt="2021-08-23T20:18:55.672"/>
   </p1510:revLst>
 </p1510:revInfo>
+</file>
+
+<file path=ppt/changesInfos/changesInfo1.xml><?xml version="1.0" encoding="utf-8"?>
+<pc:chgInfo xmlns:a="http://schemas.openxmlformats.org/drawingml/2006/main" xmlns:r="http://schemas.openxmlformats.org/officeDocument/2006/relationships" xmlns:ac="http://schemas.microsoft.com/office/drawing/2013/main/command" xmlns:pc="http://schemas.microsoft.com/office/powerpoint/2013/main/command">
+  <pc:docChgLst>
+    <pc:chgData name="Vinicius Novais" userId="cbb4d67d-f9b3-40c7-a629-1bdeb4d5c819" providerId="ADAL" clId="{5DFB136F-8639-484B-A90B-1BA63F4E797E}"/>
+    <pc:docChg chg="custSel addSld delSld modSld sldOrd modSection">
+      <pc:chgData name="Vinicius Novais" userId="cbb4d67d-f9b3-40c7-a629-1bdeb4d5c819" providerId="ADAL" clId="{5DFB136F-8639-484B-A90B-1BA63F4E797E}" dt="2021-08-23T20:19:17.616" v="12"/>
+      <pc:docMkLst>
+        <pc:docMk/>
+      </pc:docMkLst>
+      <pc:sldChg chg="del">
+        <pc:chgData name="Vinicius Novais" userId="cbb4d67d-f9b3-40c7-a629-1bdeb4d5c819" providerId="ADAL" clId="{5DFB136F-8639-484B-A90B-1BA63F4E797E}" dt="2021-08-23T20:09:59.374" v="0" actId="47"/>
+        <pc:sldMkLst>
+          <pc:docMk/>
+          <pc:sldMk cId="0" sldId="256"/>
+        </pc:sldMkLst>
+      </pc:sldChg>
+      <pc:sldChg chg="modSp del mod">
+        <pc:chgData name="Vinicius Novais" userId="cbb4d67d-f9b3-40c7-a629-1bdeb4d5c819" providerId="ADAL" clId="{5DFB136F-8639-484B-A90B-1BA63F4E797E}" dt="2021-08-23T20:18:32.800" v="2" actId="2696"/>
+        <pc:sldMkLst>
+          <pc:docMk/>
+          <pc:sldMk cId="948876888" sldId="344"/>
+        </pc:sldMkLst>
+        <pc:spChg chg="mod">
+          <ac:chgData name="Vinicius Novais" userId="cbb4d67d-f9b3-40c7-a629-1bdeb4d5c819" providerId="ADAL" clId="{5DFB136F-8639-484B-A90B-1BA63F4E797E}" dt="2021-08-23T20:15:51.414" v="1" actId="20577"/>
+          <ac:spMkLst>
+            <pc:docMk/>
+            <pc:sldMk cId="948876888" sldId="344"/>
+            <ac:spMk id="4" creationId="{C3037102-7C2A-48BA-B19A-E0AB7B0EF163}"/>
+          </ac:spMkLst>
+        </pc:spChg>
+      </pc:sldChg>
+      <pc:sldChg chg="addSp delSp modSp new mod ord">
+        <pc:chgData name="Vinicius Novais" userId="cbb4d67d-f9b3-40c7-a629-1bdeb4d5c819" providerId="ADAL" clId="{5DFB136F-8639-484B-A90B-1BA63F4E797E}" dt="2021-08-23T20:19:17.616" v="12"/>
+        <pc:sldMkLst>
+          <pc:docMk/>
+          <pc:sldMk cId="500094798" sldId="472"/>
+        </pc:sldMkLst>
+        <pc:spChg chg="del">
+          <ac:chgData name="Vinicius Novais" userId="cbb4d67d-f9b3-40c7-a629-1bdeb4d5c819" providerId="ADAL" clId="{5DFB136F-8639-484B-A90B-1BA63F4E797E}" dt="2021-08-23T20:18:52.302" v="4" actId="478"/>
+          <ac:spMkLst>
+            <pc:docMk/>
+            <pc:sldMk cId="500094798" sldId="472"/>
+            <ac:spMk id="2" creationId="{8B41AFD2-99A1-4AC3-A275-E69D0BB15C18}"/>
+          </ac:spMkLst>
+        </pc:spChg>
+        <pc:picChg chg="add mod">
+          <ac:chgData name="Vinicius Novais" userId="cbb4d67d-f9b3-40c7-a629-1bdeb4d5c819" providerId="ADAL" clId="{5DFB136F-8639-484B-A90B-1BA63F4E797E}" dt="2021-08-23T20:19:15.598" v="10" actId="14100"/>
+          <ac:picMkLst>
+            <pc:docMk/>
+            <pc:sldMk cId="500094798" sldId="472"/>
+            <ac:picMk id="5" creationId="{7DB5D056-2A03-4A1B-96E9-063C473433C7}"/>
+          </ac:picMkLst>
+        </pc:picChg>
+      </pc:sldChg>
+      <pc:sldMasterChg chg="delSldLayout">
+        <pc:chgData name="Vinicius Novais" userId="cbb4d67d-f9b3-40c7-a629-1bdeb4d5c819" providerId="ADAL" clId="{5DFB136F-8639-484B-A90B-1BA63F4E797E}" dt="2021-08-23T20:09:59.374" v="0" actId="47"/>
+        <pc:sldMasterMkLst>
+          <pc:docMk/>
+          <pc:sldMasterMk cId="0" sldId="2147483656"/>
+        </pc:sldMasterMkLst>
+        <pc:sldLayoutChg chg="del">
+          <pc:chgData name="Vinicius Novais" userId="cbb4d67d-f9b3-40c7-a629-1bdeb4d5c819" providerId="ADAL" clId="{5DFB136F-8639-484B-A90B-1BA63F4E797E}" dt="2021-08-23T20:09:59.374" v="0" actId="47"/>
+          <pc:sldLayoutMkLst>
+            <pc:docMk/>
+            <pc:sldMasterMk cId="0" sldId="2147483656"/>
+            <pc:sldLayoutMk cId="0" sldId="2147483663"/>
+          </pc:sldLayoutMkLst>
+        </pc:sldLayoutChg>
+      </pc:sldMasterChg>
+    </pc:docChg>
+  </pc:docChgLst>
+</pc:chgInfo>
 </file>
 
 <file path=ppt/handoutMasters/handoutMaster1.xml><?xml version="1.0" encoding="utf-8"?>
@@ -239,7 +310,7 @@
             <a:fld id="{C3CD65D1-5C11-455D-9F9A-0E035F00A0DA}" type="datetimeFigureOut">
               <a:rPr lang="pt-BR" smtClean="0"/>
               <a:pPr/>
-              <a:t>12/08/2021</a:t>
+              <a:t>23/08/2021</a:t>
             </a:fld>
             <a:endParaRPr lang="pt-BR"/>
           </a:p>
@@ -306,7 +377,7 @@
             <a:fld id="{CA8E3B7C-E4AE-4E9E-8479-7C668141D483}" type="slidenum">
               <a:rPr lang="pt-BR" smtClean="0"/>
               <a:pPr/>
-              <a:t>‹nº›</a:t>
+              <a:t>‹#›</a:t>
             </a:fld>
             <a:endParaRPr lang="pt-BR"/>
           </a:p>
@@ -407,7 +478,7 @@
             <a:fld id="{A05DA3EF-18EA-43DE-B1BB-402A3C558822}" type="datetimeFigureOut">
               <a:rPr lang="pt-BR" smtClean="0"/>
               <a:pPr/>
-              <a:t>12/08/2021</a:t>
+              <a:t>23/08/2021</a:t>
             </a:fld>
             <a:endParaRPr lang="pt-BR"/>
           </a:p>
@@ -568,7 +639,7 @@
             <a:fld id="{75B3645A-D0AE-4F6E-A17E-E0036A9041AF}" type="slidenum">
               <a:rPr lang="pt-BR" smtClean="0"/>
               <a:pPr/>
-              <a:t>‹nº›</a:t>
+              <a:t>‹#›</a:t>
             </a:fld>
             <a:endParaRPr lang="pt-BR"/>
           </a:p>
@@ -692,96 +763,6 @@
       </p:grpSpPr>
       <p:sp>
         <p:nvSpPr>
-          <p:cNvPr id="2" name="Espaço Reservado para Imagem de Slide 1"/>
-          <p:cNvSpPr>
-            <a:spLocks noGrp="1" noRot="1" noChangeAspect="1"/>
-          </p:cNvSpPr>
-          <p:nvPr>
-            <p:ph type="sldImg"/>
-          </p:nvPr>
-        </p:nvSpPr>
-        <p:spPr>
-          <a:xfrm>
-            <a:off x="141288" y="768350"/>
-            <a:ext cx="6821487" cy="3836988"/>
-          </a:xfrm>
-        </p:spPr>
-      </p:sp>
-      <p:sp>
-        <p:nvSpPr>
-          <p:cNvPr id="3" name="Espaço Reservado para Anotações 2"/>
-          <p:cNvSpPr>
-            <a:spLocks noGrp="1"/>
-          </p:cNvSpPr>
-          <p:nvPr>
-            <p:ph type="body" idx="1"/>
-          </p:nvPr>
-        </p:nvSpPr>
-        <p:spPr/>
-        <p:txBody>
-          <a:bodyPr/>
-          <a:lstStyle/>
-          <a:p>
-            <a:endParaRPr lang="pt-BR" dirty="0"/>
-          </a:p>
-        </p:txBody>
-      </p:sp>
-      <p:sp>
-        <p:nvSpPr>
-          <p:cNvPr id="4" name="Espaço Reservado para Número de Slide 3"/>
-          <p:cNvSpPr>
-            <a:spLocks noGrp="1"/>
-          </p:cNvSpPr>
-          <p:nvPr>
-            <p:ph type="sldNum" sz="quarter" idx="10"/>
-          </p:nvPr>
-        </p:nvSpPr>
-        <p:spPr/>
-        <p:txBody>
-          <a:bodyPr/>
-          <a:lstStyle/>
-          <a:p>
-            <a:fld id="{75B3645A-D0AE-4F6E-A17E-E0036A9041AF}" type="slidenum">
-              <a:rPr lang="pt-BR" smtClean="0"/>
-              <a:pPr/>
-              <a:t>2</a:t>
-            </a:fld>
-            <a:endParaRPr lang="pt-BR"/>
-          </a:p>
-        </p:txBody>
-      </p:sp>
-    </p:spTree>
-    <p:extLst>
-      <p:ext uri="{BB962C8B-B14F-4D97-AF65-F5344CB8AC3E}">
-        <p14:creationId xmlns:p14="http://schemas.microsoft.com/office/powerpoint/2010/main" val="3296992401"/>
-      </p:ext>
-    </p:extLst>
-  </p:cSld>
-  <p:clrMapOvr>
-    <a:masterClrMapping/>
-  </p:clrMapOvr>
-</p:notes>
-</file>
-
-<file path=ppt/notesSlides/notesSlide2.xml><?xml version="1.0" encoding="utf-8"?>
-<p:notes xmlns:a="http://schemas.openxmlformats.org/drawingml/2006/main" xmlns:r="http://schemas.openxmlformats.org/officeDocument/2006/relationships" xmlns:p="http://schemas.openxmlformats.org/presentationml/2006/main">
-  <p:cSld>
-    <p:spTree>
-      <p:nvGrpSpPr>
-        <p:cNvPr id="1" name=""/>
-        <p:cNvGrpSpPr/>
-        <p:nvPr/>
-      </p:nvGrpSpPr>
-      <p:grpSpPr>
-        <a:xfrm>
-          <a:off x="0" y="0"/>
-          <a:ext cx="0" cy="0"/>
-          <a:chOff x="0" y="0"/>
-          <a:chExt cx="0" cy="0"/>
-        </a:xfrm>
-      </p:grpSpPr>
-      <p:sp>
-        <p:nvSpPr>
           <p:cNvPr id="2" name="Slide Image Placeholder 1"/>
           <p:cNvSpPr>
             <a:spLocks noGrp="1" noRot="1" noChangeAspect="1"/>
@@ -833,7 +814,7 @@
                 </a:solidFill>
               </a:rPr>
               <a:pPr/>
-              <a:t>3</a:t>
+              <a:t>2</a:t>
             </a:fld>
             <a:endParaRPr lang="pt-BR">
               <a:solidFill>
@@ -3028,1002 +3009,6 @@
 </file>
 
 <file path=ppt/slideLayouts/slideLayout10.xml><?xml version="1.0" encoding="utf-8"?>
-<p:sldLayout xmlns:a="http://schemas.openxmlformats.org/drawingml/2006/main" xmlns:r="http://schemas.openxmlformats.org/officeDocument/2006/relationships" xmlns:p="http://schemas.openxmlformats.org/presentationml/2006/main" preserve="1">
-  <p:cSld name="Uma Parte de Conteúdo">
-    <p:spTree>
-      <p:nvGrpSpPr>
-        <p:cNvPr id="1" name=""/>
-        <p:cNvGrpSpPr/>
-        <p:nvPr/>
-      </p:nvGrpSpPr>
-      <p:grpSpPr>
-        <a:xfrm>
-          <a:off x="0" y="0"/>
-          <a:ext cx="0" cy="0"/>
-          <a:chOff x="0" y="0"/>
-          <a:chExt cx="0" cy="0"/>
-        </a:xfrm>
-      </p:grpSpPr>
-      <p:sp>
-        <p:nvSpPr>
-          <p:cNvPr id="4103" name="Freeform 7"/>
-          <p:cNvSpPr>
-            <a:spLocks/>
-          </p:cNvSpPr>
-          <p:nvPr/>
-        </p:nvSpPr>
-        <p:spPr bwMode="auto">
-          <a:xfrm>
-            <a:off x="12605478" y="6948983"/>
-            <a:ext cx="837472" cy="612280"/>
-          </a:xfrm>
-          <a:custGeom>
-            <a:avLst/>
-            <a:gdLst/>
-            <a:ahLst/>
-            <a:cxnLst>
-              <a:cxn ang="0">
-                <a:pos x="1475" y="0"/>
-              </a:cxn>
-              <a:cxn ang="0">
-                <a:pos x="742" y="258"/>
-              </a:cxn>
-              <a:cxn ang="0">
-                <a:pos x="701" y="273"/>
-              </a:cxn>
-              <a:cxn ang="0">
-                <a:pos x="660" y="290"/>
-              </a:cxn>
-              <a:cxn ang="0">
-                <a:pos x="620" y="309"/>
-              </a:cxn>
-              <a:cxn ang="0">
-                <a:pos x="582" y="329"/>
-              </a:cxn>
-              <a:cxn ang="0">
-                <a:pos x="544" y="350"/>
-              </a:cxn>
-              <a:cxn ang="0">
-                <a:pos x="508" y="373"/>
-              </a:cxn>
-              <a:cxn ang="0">
-                <a:pos x="472" y="397"/>
-              </a:cxn>
-              <a:cxn ang="0">
-                <a:pos x="437" y="422"/>
-              </a:cxn>
-              <a:cxn ang="0">
-                <a:pos x="404" y="449"/>
-              </a:cxn>
-              <a:cxn ang="0">
-                <a:pos x="371" y="477"/>
-              </a:cxn>
-              <a:cxn ang="0">
-                <a:pos x="341" y="506"/>
-              </a:cxn>
-              <a:cxn ang="0">
-                <a:pos x="311" y="536"/>
-              </a:cxn>
-              <a:cxn ang="0">
-                <a:pos x="281" y="566"/>
-              </a:cxn>
-              <a:cxn ang="0">
-                <a:pos x="254" y="599"/>
-              </a:cxn>
-              <a:cxn ang="0">
-                <a:pos x="228" y="632"/>
-              </a:cxn>
-              <a:cxn ang="0">
-                <a:pos x="203" y="666"/>
-              </a:cxn>
-              <a:cxn ang="0">
-                <a:pos x="179" y="701"/>
-              </a:cxn>
-              <a:cxn ang="0">
-                <a:pos x="158" y="738"/>
-              </a:cxn>
-              <a:cxn ang="0">
-                <a:pos x="136" y="775"/>
-              </a:cxn>
-              <a:cxn ang="0">
-                <a:pos x="117" y="813"/>
-              </a:cxn>
-              <a:cxn ang="0">
-                <a:pos x="98" y="850"/>
-              </a:cxn>
-              <a:cxn ang="0">
-                <a:pos x="82" y="890"/>
-              </a:cxn>
-              <a:cxn ang="0">
-                <a:pos x="67" y="930"/>
-              </a:cxn>
-              <a:cxn ang="0">
-                <a:pos x="53" y="970"/>
-              </a:cxn>
-              <a:cxn ang="0">
-                <a:pos x="41" y="1011"/>
-              </a:cxn>
-              <a:cxn ang="0">
-                <a:pos x="30" y="1053"/>
-              </a:cxn>
-              <a:cxn ang="0">
-                <a:pos x="21" y="1096"/>
-              </a:cxn>
-              <a:cxn ang="0">
-                <a:pos x="14" y="1138"/>
-              </a:cxn>
-              <a:cxn ang="0">
-                <a:pos x="7" y="1181"/>
-              </a:cxn>
-              <a:cxn ang="0">
-                <a:pos x="4" y="1224"/>
-              </a:cxn>
-              <a:cxn ang="0">
-                <a:pos x="1" y="1269"/>
-              </a:cxn>
-              <a:cxn ang="0">
-                <a:pos x="0" y="1313"/>
-              </a:cxn>
-              <a:cxn ang="0">
-                <a:pos x="0" y="1578"/>
-              </a:cxn>
-              <a:cxn ang="0">
-                <a:pos x="1475" y="1578"/>
-              </a:cxn>
-              <a:cxn ang="0">
-                <a:pos x="1475" y="0"/>
-              </a:cxn>
-            </a:cxnLst>
-            <a:rect l="0" t="0" r="r" b="b"/>
-            <a:pathLst>
-              <a:path w="1475" h="1578">
-                <a:moveTo>
-                  <a:pt x="1475" y="0"/>
-                </a:moveTo>
-                <a:lnTo>
-                  <a:pt x="742" y="258"/>
-                </a:lnTo>
-                <a:lnTo>
-                  <a:pt x="701" y="273"/>
-                </a:lnTo>
-                <a:lnTo>
-                  <a:pt x="660" y="290"/>
-                </a:lnTo>
-                <a:lnTo>
-                  <a:pt x="620" y="309"/>
-                </a:lnTo>
-                <a:lnTo>
-                  <a:pt x="582" y="329"/>
-                </a:lnTo>
-                <a:lnTo>
-                  <a:pt x="544" y="350"/>
-                </a:lnTo>
-                <a:lnTo>
-                  <a:pt x="508" y="373"/>
-                </a:lnTo>
-                <a:lnTo>
-                  <a:pt x="472" y="397"/>
-                </a:lnTo>
-                <a:lnTo>
-                  <a:pt x="437" y="422"/>
-                </a:lnTo>
-                <a:lnTo>
-                  <a:pt x="404" y="449"/>
-                </a:lnTo>
-                <a:lnTo>
-                  <a:pt x="371" y="477"/>
-                </a:lnTo>
-                <a:lnTo>
-                  <a:pt x="341" y="506"/>
-                </a:lnTo>
-                <a:lnTo>
-                  <a:pt x="311" y="536"/>
-                </a:lnTo>
-                <a:lnTo>
-                  <a:pt x="281" y="566"/>
-                </a:lnTo>
-                <a:lnTo>
-                  <a:pt x="254" y="599"/>
-                </a:lnTo>
-                <a:lnTo>
-                  <a:pt x="228" y="632"/>
-                </a:lnTo>
-                <a:lnTo>
-                  <a:pt x="203" y="666"/>
-                </a:lnTo>
-                <a:lnTo>
-                  <a:pt x="179" y="701"/>
-                </a:lnTo>
-                <a:lnTo>
-                  <a:pt x="158" y="738"/>
-                </a:lnTo>
-                <a:lnTo>
-                  <a:pt x="136" y="775"/>
-                </a:lnTo>
-                <a:lnTo>
-                  <a:pt x="117" y="813"/>
-                </a:lnTo>
-                <a:lnTo>
-                  <a:pt x="98" y="850"/>
-                </a:lnTo>
-                <a:lnTo>
-                  <a:pt x="82" y="890"/>
-                </a:lnTo>
-                <a:lnTo>
-                  <a:pt x="67" y="930"/>
-                </a:lnTo>
-                <a:lnTo>
-                  <a:pt x="53" y="970"/>
-                </a:lnTo>
-                <a:lnTo>
-                  <a:pt x="41" y="1011"/>
-                </a:lnTo>
-                <a:lnTo>
-                  <a:pt x="30" y="1053"/>
-                </a:lnTo>
-                <a:lnTo>
-                  <a:pt x="21" y="1096"/>
-                </a:lnTo>
-                <a:lnTo>
-                  <a:pt x="14" y="1138"/>
-                </a:lnTo>
-                <a:lnTo>
-                  <a:pt x="7" y="1181"/>
-                </a:lnTo>
-                <a:lnTo>
-                  <a:pt x="4" y="1224"/>
-                </a:lnTo>
-                <a:lnTo>
-                  <a:pt x="1" y="1269"/>
-                </a:lnTo>
-                <a:lnTo>
-                  <a:pt x="0" y="1313"/>
-                </a:lnTo>
-                <a:lnTo>
-                  <a:pt x="0" y="1578"/>
-                </a:lnTo>
-                <a:lnTo>
-                  <a:pt x="1475" y="1578"/>
-                </a:lnTo>
-                <a:lnTo>
-                  <a:pt x="1475" y="0"/>
-                </a:lnTo>
-                <a:close/>
-              </a:path>
-            </a:pathLst>
-          </a:custGeom>
-          <a:solidFill>
-            <a:srgbClr val="292C34"/>
-          </a:solidFill>
-          <a:ln w="9525">
-            <a:noFill/>
-            <a:round/>
-            <a:headEnd/>
-            <a:tailEnd/>
-          </a:ln>
-        </p:spPr>
-        <p:txBody>
-          <a:bodyPr vert="horz" wrap="square" lIns="91440" tIns="45720" rIns="91440" bIns="45720" numCol="1" anchor="t" anchorCtr="0" compatLnSpc="1">
-            <a:prstTxWarp prst="textNoShape">
-              <a:avLst/>
-            </a:prstTxWarp>
-          </a:bodyPr>
-          <a:lstStyle/>
-          <a:p>
-            <a:endParaRPr lang="pt-BR" sz="2100"/>
-          </a:p>
-        </p:txBody>
-      </p:sp>
-      <p:sp>
-        <p:nvSpPr>
-          <p:cNvPr id="18" name="Espaço Reservado para Texto 17"/>
-          <p:cNvSpPr>
-            <a:spLocks noGrp="1"/>
-          </p:cNvSpPr>
-          <p:nvPr>
-            <p:ph type="body" sz="quarter" idx="11"/>
-          </p:nvPr>
-        </p:nvSpPr>
-        <p:spPr>
-          <a:xfrm>
-            <a:off x="2828982" y="1331914"/>
-            <a:ext cx="8779933" cy="5761037"/>
-          </a:xfrm>
-          <a:prstGeom prst="rect">
-            <a:avLst/>
-          </a:prstGeom>
-        </p:spPr>
-        <p:txBody>
-          <a:bodyPr/>
-          <a:lstStyle>
-            <a:lvl1pPr>
-              <a:buClr>
-                <a:srgbClr val="32B9CD"/>
-              </a:buClr>
-              <a:defRPr>
-                <a:latin typeface="Exo 2" pitchFamily="50" charset="0"/>
-              </a:defRPr>
-            </a:lvl1pPr>
-            <a:lvl2pPr>
-              <a:buClr>
-                <a:srgbClr val="32B9CD"/>
-              </a:buClr>
-              <a:defRPr>
-                <a:latin typeface="Exo 2" pitchFamily="50" charset="0"/>
-              </a:defRPr>
-            </a:lvl2pPr>
-            <a:lvl3pPr>
-              <a:buClr>
-                <a:srgbClr val="32B9CD"/>
-              </a:buClr>
-              <a:defRPr>
-                <a:latin typeface="Exo 2" pitchFamily="50" charset="0"/>
-              </a:defRPr>
-            </a:lvl3pPr>
-            <a:lvl4pPr>
-              <a:buClr>
-                <a:srgbClr val="32B9CD"/>
-              </a:buClr>
-              <a:defRPr>
-                <a:latin typeface="Exo 2" pitchFamily="50" charset="0"/>
-              </a:defRPr>
-            </a:lvl4pPr>
-            <a:lvl5pPr>
-              <a:buClr>
-                <a:srgbClr val="32B9CD"/>
-              </a:buClr>
-              <a:defRPr>
-                <a:latin typeface="Exo 2" pitchFamily="50" charset="0"/>
-              </a:defRPr>
-            </a:lvl5pPr>
-          </a:lstStyle>
-          <a:p>
-            <a:pPr lvl="0"/>
-            <a:r>
-              <a:rPr lang="pt-BR"/>
-              <a:t>Clique para editar os estilos do texto mestre</a:t>
-            </a:r>
-          </a:p>
-          <a:p>
-            <a:pPr lvl="1"/>
-            <a:r>
-              <a:rPr lang="pt-BR"/>
-              <a:t>Segundo nível</a:t>
-            </a:r>
-          </a:p>
-          <a:p>
-            <a:pPr lvl="2"/>
-            <a:r>
-              <a:rPr lang="pt-BR"/>
-              <a:t>Terceiro nível</a:t>
-            </a:r>
-          </a:p>
-          <a:p>
-            <a:pPr lvl="3"/>
-            <a:r>
-              <a:rPr lang="pt-BR"/>
-              <a:t>Quarto nível</a:t>
-            </a:r>
-          </a:p>
-          <a:p>
-            <a:pPr lvl="4"/>
-            <a:r>
-              <a:rPr lang="pt-BR"/>
-              <a:t>Quinto nível</a:t>
-            </a:r>
-            <a:endParaRPr lang="pt-BR" dirty="0"/>
-          </a:p>
-        </p:txBody>
-      </p:sp>
-      <p:sp>
-        <p:nvSpPr>
-          <p:cNvPr id="7" name="Rectangle 4"/>
-          <p:cNvSpPr>
-            <a:spLocks noGrp="1" noChangeArrowheads="1"/>
-          </p:cNvSpPr>
-          <p:nvPr>
-            <p:ph type="sldNum" sz="quarter" idx="4"/>
-          </p:nvPr>
-        </p:nvSpPr>
-        <p:spPr bwMode="auto">
-          <a:xfrm>
-            <a:off x="12605478" y="7237015"/>
-            <a:ext cx="628646" cy="214290"/>
-          </a:xfrm>
-          <a:prstGeom prst="rect">
-            <a:avLst/>
-          </a:prstGeom>
-          <a:noFill/>
-          <a:ln w="9525">
-            <a:noFill/>
-            <a:miter lim="800000"/>
-            <a:headEnd/>
-            <a:tailEnd/>
-          </a:ln>
-          <a:effectLst/>
-        </p:spPr>
-        <p:txBody>
-          <a:bodyPr vert="horz" wrap="square" lIns="18000" tIns="10800" rIns="18000" bIns="10800" numCol="1" anchor="t" anchorCtr="0" compatLnSpc="1">
-            <a:prstTxWarp prst="textNoShape">
-              <a:avLst/>
-            </a:prstTxWarp>
-          </a:bodyPr>
-          <a:lstStyle>
-            <a:lvl1pPr algn="r">
-              <a:spcBef>
-                <a:spcPct val="0"/>
-              </a:spcBef>
-              <a:spcAft>
-                <a:spcPct val="0"/>
-              </a:spcAft>
-              <a:defRPr sz="1000" b="1">
-                <a:solidFill>
-                  <a:schemeClr val="bg1"/>
-                </a:solidFill>
-                <a:latin typeface="Exo 2" pitchFamily="50" charset="0"/>
-                <a:ea typeface="Tahoma" pitchFamily="34" charset="0"/>
-                <a:cs typeface="Tahoma" pitchFamily="34" charset="0"/>
-              </a:defRPr>
-            </a:lvl1pPr>
-          </a:lstStyle>
-          <a:p>
-            <a:pPr>
-              <a:defRPr/>
-            </a:pPr>
-            <a:fld id="{B66251D2-9488-44CD-87B4-F793A73C4A01}" type="slidenum">
-              <a:rPr lang="pt-BR" smtClean="0"/>
-              <a:pPr>
-                <a:defRPr/>
-              </a:pPr>
-              <a:t>‹nº›</a:t>
-            </a:fld>
-            <a:endParaRPr lang="pt-BR" sz="700" dirty="0"/>
-          </a:p>
-        </p:txBody>
-      </p:sp>
-      <p:sp>
-        <p:nvSpPr>
-          <p:cNvPr id="9" name="Freeform 6"/>
-          <p:cNvSpPr>
-            <a:spLocks/>
-          </p:cNvSpPr>
-          <p:nvPr/>
-        </p:nvSpPr>
-        <p:spPr bwMode="auto">
-          <a:xfrm>
-            <a:off x="1" y="1"/>
-            <a:ext cx="2401423" cy="1332359"/>
-          </a:xfrm>
-          <a:custGeom>
-            <a:avLst/>
-            <a:gdLst/>
-            <a:ahLst/>
-            <a:cxnLst>
-              <a:cxn ang="0">
-                <a:pos x="3091" y="1686"/>
-              </a:cxn>
-              <a:cxn ang="0">
-                <a:pos x="3117" y="1687"/>
-              </a:cxn>
-              <a:cxn ang="0">
-                <a:pos x="3156" y="1689"/>
-              </a:cxn>
-              <a:cxn ang="0">
-                <a:pos x="3169" y="1687"/>
-              </a:cxn>
-              <a:cxn ang="0">
-                <a:pos x="3252" y="1655"/>
-              </a:cxn>
-              <a:cxn ang="0">
-                <a:pos x="3332" y="1617"/>
-              </a:cxn>
-              <a:cxn ang="0">
-                <a:pos x="3408" y="1573"/>
-              </a:cxn>
-              <a:cxn ang="0">
-                <a:pos x="3478" y="1523"/>
-              </a:cxn>
-              <a:cxn ang="0">
-                <a:pos x="3545" y="1469"/>
-              </a:cxn>
-              <a:cxn ang="0">
-                <a:pos x="3608" y="1411"/>
-              </a:cxn>
-              <a:cxn ang="0">
-                <a:pos x="3665" y="1346"/>
-              </a:cxn>
-              <a:cxn ang="0">
-                <a:pos x="3718" y="1279"/>
-              </a:cxn>
-              <a:cxn ang="0">
-                <a:pos x="3765" y="1207"/>
-              </a:cxn>
-              <a:cxn ang="0">
-                <a:pos x="3807" y="1133"/>
-              </a:cxn>
-              <a:cxn ang="0">
-                <a:pos x="3842" y="1055"/>
-              </a:cxn>
-              <a:cxn ang="0">
-                <a:pos x="3872" y="974"/>
-              </a:cxn>
-              <a:cxn ang="0">
-                <a:pos x="3896" y="890"/>
-              </a:cxn>
-              <a:cxn ang="0">
-                <a:pos x="3913" y="805"/>
-              </a:cxn>
-              <a:cxn ang="0">
-                <a:pos x="3923" y="717"/>
-              </a:cxn>
-              <a:cxn ang="0">
-                <a:pos x="3927" y="628"/>
-              </a:cxn>
-              <a:cxn ang="0">
-                <a:pos x="3855" y="0"/>
-              </a:cxn>
-              <a:cxn ang="0">
-                <a:pos x="3088" y="0"/>
-              </a:cxn>
-              <a:cxn ang="0">
-                <a:pos x="3855" y="278"/>
-              </a:cxn>
-              <a:cxn ang="0">
-                <a:pos x="3853" y="671"/>
-              </a:cxn>
-              <a:cxn ang="0">
-                <a:pos x="3847" y="753"/>
-              </a:cxn>
-              <a:cxn ang="0">
-                <a:pos x="3834" y="834"/>
-              </a:cxn>
-              <a:cxn ang="0">
-                <a:pos x="3814" y="913"/>
-              </a:cxn>
-              <a:cxn ang="0">
-                <a:pos x="3790" y="990"/>
-              </a:cxn>
-              <a:cxn ang="0">
-                <a:pos x="3759" y="1063"/>
-              </a:cxn>
-              <a:cxn ang="0">
-                <a:pos x="3723" y="1135"/>
-              </a:cxn>
-              <a:cxn ang="0">
-                <a:pos x="3682" y="1204"/>
-              </a:cxn>
-              <a:cxn ang="0">
-                <a:pos x="3635" y="1269"/>
-              </a:cxn>
-              <a:cxn ang="0">
-                <a:pos x="3583" y="1330"/>
-              </a:cxn>
-              <a:cxn ang="0">
-                <a:pos x="3528" y="1388"/>
-              </a:cxn>
-              <a:cxn ang="0">
-                <a:pos x="3467" y="1441"/>
-              </a:cxn>
-              <a:cxn ang="0">
-                <a:pos x="3403" y="1489"/>
-              </a:cxn>
-              <a:cxn ang="0">
-                <a:pos x="3333" y="1533"/>
-              </a:cxn>
-              <a:cxn ang="0">
-                <a:pos x="3261" y="1571"/>
-              </a:cxn>
-              <a:cxn ang="0">
-                <a:pos x="3185" y="1604"/>
-              </a:cxn>
-              <a:cxn ang="0">
-                <a:pos x="3140" y="1621"/>
-              </a:cxn>
-              <a:cxn ang="0">
-                <a:pos x="3121" y="1636"/>
-              </a:cxn>
-              <a:cxn ang="0">
-                <a:pos x="3091" y="1661"/>
-              </a:cxn>
-              <a:cxn ang="0">
-                <a:pos x="0" y="2718"/>
-              </a:cxn>
-            </a:cxnLst>
-            <a:rect l="0" t="0" r="r" b="b"/>
-            <a:pathLst>
-              <a:path w="3927" h="2740">
-                <a:moveTo>
-                  <a:pt x="0" y="2740"/>
-                </a:moveTo>
-                <a:lnTo>
-                  <a:pt x="3091" y="1686"/>
-                </a:lnTo>
-                <a:lnTo>
-                  <a:pt x="3098" y="1686"/>
-                </a:lnTo>
-                <a:lnTo>
-                  <a:pt x="3117" y="1687"/>
-                </a:lnTo>
-                <a:lnTo>
-                  <a:pt x="3139" y="1689"/>
-                </a:lnTo>
-                <a:lnTo>
-                  <a:pt x="3156" y="1689"/>
-                </a:lnTo>
-                <a:lnTo>
-                  <a:pt x="3163" y="1689"/>
-                </a:lnTo>
-                <a:lnTo>
-                  <a:pt x="3169" y="1687"/>
-                </a:lnTo>
-                <a:lnTo>
-                  <a:pt x="3211" y="1672"/>
-                </a:lnTo>
-                <a:lnTo>
-                  <a:pt x="3252" y="1655"/>
-                </a:lnTo>
-                <a:lnTo>
-                  <a:pt x="3293" y="1637"/>
-                </a:lnTo>
-                <a:lnTo>
-                  <a:pt x="3332" y="1617"/>
-                </a:lnTo>
-                <a:lnTo>
-                  <a:pt x="3370" y="1595"/>
-                </a:lnTo>
-                <a:lnTo>
-                  <a:pt x="3408" y="1573"/>
-                </a:lnTo>
-                <a:lnTo>
-                  <a:pt x="3443" y="1549"/>
-                </a:lnTo>
-                <a:lnTo>
-                  <a:pt x="3478" y="1523"/>
-                </a:lnTo>
-                <a:lnTo>
-                  <a:pt x="3512" y="1497"/>
-                </a:lnTo>
-                <a:lnTo>
-                  <a:pt x="3545" y="1469"/>
-                </a:lnTo>
-                <a:lnTo>
-                  <a:pt x="3577" y="1440"/>
-                </a:lnTo>
-                <a:lnTo>
-                  <a:pt x="3608" y="1411"/>
-                </a:lnTo>
-                <a:lnTo>
-                  <a:pt x="3637" y="1379"/>
-                </a:lnTo>
-                <a:lnTo>
-                  <a:pt x="3665" y="1346"/>
-                </a:lnTo>
-                <a:lnTo>
-                  <a:pt x="3692" y="1314"/>
-                </a:lnTo>
-                <a:lnTo>
-                  <a:pt x="3718" y="1279"/>
-                </a:lnTo>
-                <a:lnTo>
-                  <a:pt x="3742" y="1244"/>
-                </a:lnTo>
-                <a:lnTo>
-                  <a:pt x="3765" y="1207"/>
-                </a:lnTo>
-                <a:lnTo>
-                  <a:pt x="3786" y="1171"/>
-                </a:lnTo>
-                <a:lnTo>
-                  <a:pt x="3807" y="1133"/>
-                </a:lnTo>
-                <a:lnTo>
-                  <a:pt x="3826" y="1094"/>
-                </a:lnTo>
-                <a:lnTo>
-                  <a:pt x="3842" y="1055"/>
-                </a:lnTo>
-                <a:lnTo>
-                  <a:pt x="3858" y="1014"/>
-                </a:lnTo>
-                <a:lnTo>
-                  <a:pt x="3872" y="974"/>
-                </a:lnTo>
-                <a:lnTo>
-                  <a:pt x="3885" y="932"/>
-                </a:lnTo>
-                <a:lnTo>
-                  <a:pt x="3896" y="890"/>
-                </a:lnTo>
-                <a:lnTo>
-                  <a:pt x="3905" y="848"/>
-                </a:lnTo>
-                <a:lnTo>
-                  <a:pt x="3913" y="805"/>
-                </a:lnTo>
-                <a:lnTo>
-                  <a:pt x="3919" y="762"/>
-                </a:lnTo>
-                <a:lnTo>
-                  <a:pt x="3923" y="717"/>
-                </a:lnTo>
-                <a:lnTo>
-                  <a:pt x="3927" y="673"/>
-                </a:lnTo>
-                <a:lnTo>
-                  <a:pt x="3927" y="628"/>
-                </a:lnTo>
-                <a:lnTo>
-                  <a:pt x="3927" y="0"/>
-                </a:lnTo>
-                <a:lnTo>
-                  <a:pt x="3855" y="0"/>
-                </a:lnTo>
-                <a:lnTo>
-                  <a:pt x="3855" y="256"/>
-                </a:lnTo>
-                <a:lnTo>
-                  <a:pt x="3088" y="0"/>
-                </a:lnTo>
-                <a:lnTo>
-                  <a:pt x="3022" y="0"/>
-                </a:lnTo>
-                <a:lnTo>
-                  <a:pt x="3855" y="278"/>
-                </a:lnTo>
-                <a:lnTo>
-                  <a:pt x="3855" y="628"/>
-                </a:lnTo>
-                <a:lnTo>
-                  <a:pt x="3853" y="671"/>
-                </a:lnTo>
-                <a:lnTo>
-                  <a:pt x="3851" y="711"/>
-                </a:lnTo>
-                <a:lnTo>
-                  <a:pt x="3847" y="753"/>
-                </a:lnTo>
-                <a:lnTo>
-                  <a:pt x="3841" y="793"/>
-                </a:lnTo>
-                <a:lnTo>
-                  <a:pt x="3834" y="834"/>
-                </a:lnTo>
-                <a:lnTo>
-                  <a:pt x="3826" y="874"/>
-                </a:lnTo>
-                <a:lnTo>
-                  <a:pt x="3814" y="913"/>
-                </a:lnTo>
-                <a:lnTo>
-                  <a:pt x="3803" y="951"/>
-                </a:lnTo>
-                <a:lnTo>
-                  <a:pt x="3790" y="990"/>
-                </a:lnTo>
-                <a:lnTo>
-                  <a:pt x="3775" y="1027"/>
-                </a:lnTo>
-                <a:lnTo>
-                  <a:pt x="3759" y="1063"/>
-                </a:lnTo>
-                <a:lnTo>
-                  <a:pt x="3742" y="1100"/>
-                </a:lnTo>
-                <a:lnTo>
-                  <a:pt x="3723" y="1135"/>
-                </a:lnTo>
-                <a:lnTo>
-                  <a:pt x="3703" y="1170"/>
-                </a:lnTo>
-                <a:lnTo>
-                  <a:pt x="3682" y="1204"/>
-                </a:lnTo>
-                <a:lnTo>
-                  <a:pt x="3659" y="1237"/>
-                </a:lnTo>
-                <a:lnTo>
-                  <a:pt x="3635" y="1269"/>
-                </a:lnTo>
-                <a:lnTo>
-                  <a:pt x="3610" y="1300"/>
-                </a:lnTo>
-                <a:lnTo>
-                  <a:pt x="3583" y="1330"/>
-                </a:lnTo>
-                <a:lnTo>
-                  <a:pt x="3555" y="1359"/>
-                </a:lnTo>
-                <a:lnTo>
-                  <a:pt x="3528" y="1388"/>
-                </a:lnTo>
-                <a:lnTo>
-                  <a:pt x="3497" y="1415"/>
-                </a:lnTo>
-                <a:lnTo>
-                  <a:pt x="3467" y="1441"/>
-                </a:lnTo>
-                <a:lnTo>
-                  <a:pt x="3435" y="1465"/>
-                </a:lnTo>
-                <a:lnTo>
-                  <a:pt x="3403" y="1489"/>
-                </a:lnTo>
-                <a:lnTo>
-                  <a:pt x="3368" y="1512"/>
-                </a:lnTo>
-                <a:lnTo>
-                  <a:pt x="3333" y="1533"/>
-                </a:lnTo>
-                <a:lnTo>
-                  <a:pt x="3298" y="1552"/>
-                </a:lnTo>
-                <a:lnTo>
-                  <a:pt x="3261" y="1571"/>
-                </a:lnTo>
-                <a:lnTo>
-                  <a:pt x="3223" y="1588"/>
-                </a:lnTo>
-                <a:lnTo>
-                  <a:pt x="3185" y="1604"/>
-                </a:lnTo>
-                <a:lnTo>
-                  <a:pt x="3145" y="1618"/>
-                </a:lnTo>
-                <a:lnTo>
-                  <a:pt x="3140" y="1621"/>
-                </a:lnTo>
-                <a:lnTo>
-                  <a:pt x="3135" y="1624"/>
-                </a:lnTo>
-                <a:lnTo>
-                  <a:pt x="3121" y="1636"/>
-                </a:lnTo>
-                <a:lnTo>
-                  <a:pt x="3104" y="1650"/>
-                </a:lnTo>
-                <a:lnTo>
-                  <a:pt x="3091" y="1661"/>
-                </a:lnTo>
-                <a:lnTo>
-                  <a:pt x="3084" y="1666"/>
-                </a:lnTo>
-                <a:lnTo>
-                  <a:pt x="0" y="2718"/>
-                </a:lnTo>
-                <a:lnTo>
-                  <a:pt x="0" y="2740"/>
-                </a:lnTo>
-                <a:close/>
-              </a:path>
-            </a:pathLst>
-          </a:custGeom>
-          <a:solidFill>
-            <a:srgbClr val="3B3D42"/>
-          </a:solidFill>
-          <a:ln w="9525">
-            <a:noFill/>
-            <a:round/>
-            <a:headEnd/>
-            <a:tailEnd/>
-          </a:ln>
-        </p:spPr>
-        <p:txBody>
-          <a:bodyPr vert="horz" wrap="square" lIns="91440" tIns="45720" rIns="91440" bIns="45720" numCol="1" anchor="t" anchorCtr="0" compatLnSpc="1">
-            <a:prstTxWarp prst="textNoShape">
-              <a:avLst/>
-            </a:prstTxWarp>
-          </a:bodyPr>
-          <a:lstStyle/>
-          <a:p>
-            <a:endParaRPr lang="pt-BR" sz="2100"/>
-          </a:p>
-        </p:txBody>
-      </p:sp>
-      <p:sp>
-        <p:nvSpPr>
-          <p:cNvPr id="10" name="Espaço Reservado para Texto 15"/>
-          <p:cNvSpPr>
-            <a:spLocks noGrp="1"/>
-          </p:cNvSpPr>
-          <p:nvPr>
-            <p:ph type="body" sz="quarter" idx="13" hasCustomPrompt="1"/>
-          </p:nvPr>
-        </p:nvSpPr>
-        <p:spPr>
-          <a:xfrm>
-            <a:off x="2829885" y="108224"/>
-            <a:ext cx="10137686" cy="765639"/>
-          </a:xfrm>
-          <a:prstGeom prst="rect">
-            <a:avLst/>
-          </a:prstGeom>
-        </p:spPr>
-        <p:txBody>
-          <a:bodyPr anchor="t"/>
-          <a:lstStyle>
-            <a:lvl1pPr>
-              <a:buNone/>
-              <a:defRPr sz="3000" b="1" baseline="0">
-                <a:solidFill>
-                  <a:srgbClr val="32B9CD"/>
-                </a:solidFill>
-                <a:latin typeface="Exo 2" pitchFamily="50" charset="0"/>
-              </a:defRPr>
-            </a:lvl1pPr>
-            <a:lvl2pPr>
-              <a:buNone/>
-              <a:defRPr sz="3000">
-                <a:latin typeface="Exo 2" pitchFamily="50" charset="0"/>
-              </a:defRPr>
-            </a:lvl2pPr>
-            <a:lvl3pPr>
-              <a:buNone/>
-              <a:defRPr sz="3000">
-                <a:latin typeface="Exo 2" pitchFamily="50" charset="0"/>
-              </a:defRPr>
-            </a:lvl3pPr>
-            <a:lvl4pPr>
-              <a:buNone/>
-              <a:defRPr sz="3000">
-                <a:latin typeface="Exo 2" pitchFamily="50" charset="0"/>
-              </a:defRPr>
-            </a:lvl4pPr>
-            <a:lvl5pPr>
-              <a:buNone/>
-              <a:defRPr sz="3000">
-                <a:latin typeface="Exo 2" pitchFamily="50" charset="0"/>
-              </a:defRPr>
-            </a:lvl5pPr>
-          </a:lstStyle>
-          <a:p>
-            <a:pPr lvl="0"/>
-            <a:r>
-              <a:rPr lang="pt-BR" dirty="0"/>
-              <a:t>Clique para editar título do slide</a:t>
-            </a:r>
-          </a:p>
-        </p:txBody>
-      </p:sp>
-      <p:pic>
-        <p:nvPicPr>
-          <p:cNvPr id="11" name="Imagem 10"/>
-          <p:cNvPicPr>
-            <a:picLocks noChangeAspect="1"/>
-          </p:cNvPicPr>
-          <p:nvPr userDrawn="1"/>
-        </p:nvPicPr>
-        <p:blipFill>
-          <a:blip r:embed="rId2" cstate="print">
-            <a:extLst>
-              <a:ext uri="{28A0092B-C50C-407E-A947-70E740481C1C}">
-                <a14:useLocalDpi xmlns:a14="http://schemas.microsoft.com/office/drawing/2010/main" val="0"/>
-              </a:ext>
-            </a:extLst>
-          </a:blip>
-          <a:stretch>
-            <a:fillRect/>
-          </a:stretch>
-        </p:blipFill>
-        <p:spPr>
-          <a:xfrm>
-            <a:off x="212219" y="166075"/>
-            <a:ext cx="1687192" cy="500104"/>
-          </a:xfrm>
-          <a:prstGeom prst="rect">
-            <a:avLst/>
-          </a:prstGeom>
-        </p:spPr>
-      </p:pic>
-    </p:spTree>
-  </p:cSld>
-  <p:clrMapOvr>
-    <a:masterClrMapping/>
-  </p:clrMapOvr>
-  <p:hf hdr="0" ftr="0" dt="0"/>
-</p:sldLayout>
-</file>
-
-<file path=ppt/slideLayouts/slideLayout11.xml><?xml version="1.0" encoding="utf-8"?>
 <p:sldLayout xmlns:a="http://schemas.openxmlformats.org/drawingml/2006/main" xmlns:r="http://schemas.openxmlformats.org/officeDocument/2006/relationships" xmlns:p="http://schemas.openxmlformats.org/presentationml/2006/main" preserve="1">
   <p:cSld name="Duas Partes de Conteúdo">
     <p:spTree>
@@ -5274,7 +4259,7 @@
               <a:pPr>
                 <a:defRPr/>
               </a:pPr>
-              <a:t>‹nº›</a:t>
+              <a:t>‹#›</a:t>
             </a:fld>
             <a:endParaRPr lang="pt-BR" sz="700" dirty="0"/>
           </a:p>
@@ -5319,7 +4304,7 @@
 </p:sldLayout>
 </file>
 
-<file path=ppt/slideLayouts/slideLayout12.xml><?xml version="1.0" encoding="utf-8"?>
+<file path=ppt/slideLayouts/slideLayout11.xml><?xml version="1.0" encoding="utf-8"?>
 <p:sldLayout xmlns:a="http://schemas.openxmlformats.org/drawingml/2006/main" xmlns:r="http://schemas.openxmlformats.org/officeDocument/2006/relationships" xmlns:p="http://schemas.openxmlformats.org/presentationml/2006/main" preserve="1">
   <p:cSld name="Encerramento 1">
     <p:spTree>
@@ -7424,7 +6409,7 @@
 </p:sldLayout>
 </file>
 
-<file path=ppt/slideLayouts/slideLayout13.xml><?xml version="1.0" encoding="utf-8"?>
+<file path=ppt/slideLayouts/slideLayout12.xml><?xml version="1.0" encoding="utf-8"?>
 <p:sldLayout xmlns:a="http://schemas.openxmlformats.org/drawingml/2006/main" xmlns:r="http://schemas.openxmlformats.org/officeDocument/2006/relationships" xmlns:p="http://schemas.openxmlformats.org/presentationml/2006/main" preserve="1" userDrawn="1">
   <p:cSld name="Encerramento 2">
     <p:spTree>
@@ -14553,8 +13538,8 @@
 </file>
 
 <file path=ppt/slideLayouts/slideLayout5.xml><?xml version="1.0" encoding="utf-8"?>
-<p:sldLayout xmlns:a="http://schemas.openxmlformats.org/drawingml/2006/main" xmlns:r="http://schemas.openxmlformats.org/officeDocument/2006/relationships" xmlns:p="http://schemas.openxmlformats.org/presentationml/2006/main" userDrawn="1">
-  <p:cSld name="Capa 1B">
+<p:sldLayout xmlns:a="http://schemas.openxmlformats.org/drawingml/2006/main" xmlns:r="http://schemas.openxmlformats.org/officeDocument/2006/relationships" xmlns:p="http://schemas.openxmlformats.org/presentationml/2006/main" preserve="1" userDrawn="1">
+  <p:cSld name="Capa 2B">
     <p:spTree>
       <p:nvGrpSpPr>
         <p:cNvPr id="1" name=""/>
@@ -16638,36 +15623,6 @@
           </a:p>
         </p:txBody>
       </p:sp>
-      <p:pic>
-        <p:nvPicPr>
-          <p:cNvPr id="9" name="Imagem 8"/>
-          <p:cNvPicPr>
-            <a:picLocks noChangeAspect="1"/>
-          </p:cNvPicPr>
-          <p:nvPr userDrawn="1"/>
-        </p:nvPicPr>
-        <p:blipFill>
-          <a:blip r:embed="rId2" cstate="print">
-            <a:extLst>
-              <a:ext uri="{28A0092B-C50C-407E-A947-70E740481C1C}">
-                <a14:useLocalDpi xmlns:a14="http://schemas.microsoft.com/office/drawing/2010/main" val="0"/>
-              </a:ext>
-            </a:extLst>
-          </a:blip>
-          <a:stretch>
-            <a:fillRect/>
-          </a:stretch>
-        </p:blipFill>
-        <p:spPr>
-          <a:xfrm>
-            <a:off x="4002937" y="2990549"/>
-            <a:ext cx="5437077" cy="1611614"/>
-          </a:xfrm>
-          <a:prstGeom prst="rect">
-            <a:avLst/>
-          </a:prstGeom>
-        </p:spPr>
-      </p:pic>
     </p:spTree>
   </p:cSld>
   <p:clrMapOvr>
@@ -16677,2100 +15632,6 @@
 </file>
 
 <file path=ppt/slideLayouts/slideLayout6.xml><?xml version="1.0" encoding="utf-8"?>
-<p:sldLayout xmlns:a="http://schemas.openxmlformats.org/drawingml/2006/main" xmlns:r="http://schemas.openxmlformats.org/officeDocument/2006/relationships" xmlns:p="http://schemas.openxmlformats.org/presentationml/2006/main" preserve="1" userDrawn="1">
-  <p:cSld name="Capa 2B">
-    <p:spTree>
-      <p:nvGrpSpPr>
-        <p:cNvPr id="1" name=""/>
-        <p:cNvGrpSpPr/>
-        <p:nvPr/>
-      </p:nvGrpSpPr>
-      <p:grpSpPr>
-        <a:xfrm>
-          <a:off x="0" y="0"/>
-          <a:ext cx="0" cy="0"/>
-          <a:chOff x="0" y="0"/>
-          <a:chExt cx="0" cy="0"/>
-        </a:xfrm>
-      </p:grpSpPr>
-      <p:sp>
-        <p:nvSpPr>
-          <p:cNvPr id="1029" name="Freeform 5"/>
-          <p:cNvSpPr>
-            <a:spLocks/>
-          </p:cNvSpPr>
-          <p:nvPr userDrawn="1"/>
-        </p:nvSpPr>
-        <p:spPr bwMode="auto">
-          <a:xfrm>
-            <a:off x="1" y="157163"/>
-            <a:ext cx="4793641" cy="7404100"/>
-          </a:xfrm>
-          <a:custGeom>
-            <a:avLst/>
-            <a:gdLst/>
-            <a:ahLst/>
-            <a:cxnLst>
-              <a:cxn ang="0">
-                <a:pos x="7123" y="13680"/>
-              </a:cxn>
-              <a:cxn ang="0">
-                <a:pos x="7083" y="13628"/>
-              </a:cxn>
-              <a:cxn ang="0">
-                <a:pos x="6987" y="13512"/>
-              </a:cxn>
-              <a:cxn ang="0">
-                <a:pos x="3221" y="2363"/>
-              </a:cxn>
-              <a:cxn ang="0">
-                <a:pos x="3226" y="2257"/>
-              </a:cxn>
-              <a:cxn ang="0">
-                <a:pos x="3219" y="2223"/>
-              </a:cxn>
-              <a:cxn ang="0">
-                <a:pos x="3074" y="1858"/>
-              </a:cxn>
-              <a:cxn ang="0">
-                <a:pos x="2894" y="1519"/>
-              </a:cxn>
-              <a:cxn ang="0">
-                <a:pos x="2680" y="1210"/>
-              </a:cxn>
-              <a:cxn ang="0">
-                <a:pos x="2435" y="929"/>
-              </a:cxn>
-              <a:cxn ang="0">
-                <a:pos x="2160" y="683"/>
-              </a:cxn>
-              <a:cxn ang="0">
-                <a:pos x="1855" y="471"/>
-              </a:cxn>
-              <a:cxn ang="0">
-                <a:pos x="1522" y="295"/>
-              </a:cxn>
-              <a:cxn ang="0">
-                <a:pos x="1163" y="158"/>
-              </a:cxn>
-              <a:cxn ang="0">
-                <a:pos x="779" y="63"/>
-              </a:cxn>
-              <a:cxn ang="0">
-                <a:pos x="371" y="10"/>
-              </a:cxn>
-              <a:cxn ang="0">
-                <a:pos x="0" y="0"/>
-              </a:cxn>
-              <a:cxn ang="0">
-                <a:pos x="62" y="213"/>
-              </a:cxn>
-              <a:cxn ang="0">
-                <a:pos x="0" y="575"/>
-              </a:cxn>
-              <a:cxn ang="0">
-                <a:pos x="312" y="213"/>
-              </a:cxn>
-              <a:cxn ang="0">
-                <a:pos x="673" y="250"/>
-              </a:cxn>
-              <a:cxn ang="0">
-                <a:pos x="1019" y="331"/>
-              </a:cxn>
-              <a:cxn ang="0">
-                <a:pos x="1348" y="451"/>
-              </a:cxn>
-              <a:cxn ang="0">
-                <a:pos x="1657" y="607"/>
-              </a:cxn>
-              <a:cxn ang="0">
-                <a:pos x="1945" y="799"/>
-              </a:cxn>
-              <a:cxn ang="0">
-                <a:pos x="2208" y="1022"/>
-              </a:cxn>
-              <a:cxn ang="0">
-                <a:pos x="2445" y="1274"/>
-              </a:cxn>
-              <a:cxn ang="0">
-                <a:pos x="2654" y="1553"/>
-              </a:cxn>
-              <a:cxn ang="0">
-                <a:pos x="2830" y="1857"/>
-              </a:cxn>
-              <a:cxn ang="0">
-                <a:pos x="2976" y="2180"/>
-              </a:cxn>
-              <a:cxn ang="0">
-                <a:pos x="3025" y="2311"/>
-              </a:cxn>
-              <a:cxn ang="0">
-                <a:pos x="3064" y="2360"/>
-              </a:cxn>
-              <a:cxn ang="0">
-                <a:pos x="3158" y="2468"/>
-              </a:cxn>
-              <a:cxn ang="0">
-                <a:pos x="6929" y="13578"/>
-              </a:cxn>
-              <a:cxn ang="0">
-                <a:pos x="6925" y="13661"/>
-              </a:cxn>
-              <a:cxn ang="0">
-                <a:pos x="6923" y="13731"/>
-              </a:cxn>
-              <a:cxn ang="0">
-                <a:pos x="6925" y="13758"/>
-              </a:cxn>
-              <a:cxn ang="0">
-                <a:pos x="6945" y="13823"/>
-              </a:cxn>
-              <a:cxn ang="0">
-                <a:pos x="6969" y="13907"/>
-              </a:cxn>
-              <a:cxn ang="0">
-                <a:pos x="6988" y="13992"/>
-              </a:cxn>
-              <a:cxn ang="0">
-                <a:pos x="7193" y="13919"/>
-              </a:cxn>
-              <a:cxn ang="0">
-                <a:pos x="7165" y="13808"/>
-              </a:cxn>
-              <a:cxn ang="0">
-                <a:pos x="7132" y="13698"/>
-              </a:cxn>
-            </a:cxnLst>
-            <a:rect l="0" t="0" r="r" b="b"/>
-            <a:pathLst>
-              <a:path w="7207" h="13992">
-                <a:moveTo>
-                  <a:pt x="7132" y="13698"/>
-                </a:moveTo>
-                <a:lnTo>
-                  <a:pt x="7127" y="13689"/>
-                </a:lnTo>
-                <a:lnTo>
-                  <a:pt x="7123" y="13680"/>
-                </a:lnTo>
-                <a:lnTo>
-                  <a:pt x="7117" y="13671"/>
-                </a:lnTo>
-                <a:lnTo>
-                  <a:pt x="7112" y="13664"/>
-                </a:lnTo>
-                <a:lnTo>
-                  <a:pt x="7083" y="13628"/>
-                </a:lnTo>
-                <a:lnTo>
-                  <a:pt x="7046" y="13584"/>
-                </a:lnTo>
-                <a:lnTo>
-                  <a:pt x="7011" y="13541"/>
-                </a:lnTo>
-                <a:lnTo>
-                  <a:pt x="6987" y="13512"/>
-                </a:lnTo>
-                <a:lnTo>
-                  <a:pt x="3216" y="2449"/>
-                </a:lnTo>
-                <a:lnTo>
-                  <a:pt x="3218" y="2414"/>
-                </a:lnTo>
-                <a:lnTo>
-                  <a:pt x="3221" y="2363"/>
-                </a:lnTo>
-                <a:lnTo>
-                  <a:pt x="3223" y="2310"/>
-                </a:lnTo>
-                <a:lnTo>
-                  <a:pt x="3224" y="2268"/>
-                </a:lnTo>
-                <a:lnTo>
-                  <a:pt x="3226" y="2257"/>
-                </a:lnTo>
-                <a:lnTo>
-                  <a:pt x="3224" y="2246"/>
-                </a:lnTo>
-                <a:lnTo>
-                  <a:pt x="3223" y="2234"/>
-                </a:lnTo>
-                <a:lnTo>
-                  <a:pt x="3219" y="2223"/>
-                </a:lnTo>
-                <a:lnTo>
-                  <a:pt x="3175" y="2099"/>
-                </a:lnTo>
-                <a:lnTo>
-                  <a:pt x="3126" y="1977"/>
-                </a:lnTo>
-                <a:lnTo>
-                  <a:pt x="3074" y="1858"/>
-                </a:lnTo>
-                <a:lnTo>
-                  <a:pt x="3017" y="1742"/>
-                </a:lnTo>
-                <a:lnTo>
-                  <a:pt x="2957" y="1629"/>
-                </a:lnTo>
-                <a:lnTo>
-                  <a:pt x="2894" y="1519"/>
-                </a:lnTo>
-                <a:lnTo>
-                  <a:pt x="2825" y="1413"/>
-                </a:lnTo>
-                <a:lnTo>
-                  <a:pt x="2755" y="1310"/>
-                </a:lnTo>
-                <a:lnTo>
-                  <a:pt x="2680" y="1210"/>
-                </a:lnTo>
-                <a:lnTo>
-                  <a:pt x="2602" y="1113"/>
-                </a:lnTo>
-                <a:lnTo>
-                  <a:pt x="2520" y="1019"/>
-                </a:lnTo>
-                <a:lnTo>
-                  <a:pt x="2435" y="929"/>
-                </a:lnTo>
-                <a:lnTo>
-                  <a:pt x="2347" y="844"/>
-                </a:lnTo>
-                <a:lnTo>
-                  <a:pt x="2254" y="761"/>
-                </a:lnTo>
-                <a:lnTo>
-                  <a:pt x="2160" y="683"/>
-                </a:lnTo>
-                <a:lnTo>
-                  <a:pt x="2061" y="609"/>
-                </a:lnTo>
-                <a:lnTo>
-                  <a:pt x="1959" y="538"/>
-                </a:lnTo>
-                <a:lnTo>
-                  <a:pt x="1855" y="471"/>
-                </a:lnTo>
-                <a:lnTo>
-                  <a:pt x="1747" y="408"/>
-                </a:lnTo>
-                <a:lnTo>
-                  <a:pt x="1637" y="350"/>
-                </a:lnTo>
-                <a:lnTo>
-                  <a:pt x="1522" y="295"/>
-                </a:lnTo>
-                <a:lnTo>
-                  <a:pt x="1406" y="245"/>
-                </a:lnTo>
-                <a:lnTo>
-                  <a:pt x="1286" y="199"/>
-                </a:lnTo>
-                <a:lnTo>
-                  <a:pt x="1163" y="158"/>
-                </a:lnTo>
-                <a:lnTo>
-                  <a:pt x="1038" y="121"/>
-                </a:lnTo>
-                <a:lnTo>
-                  <a:pt x="911" y="89"/>
-                </a:lnTo>
-                <a:lnTo>
-                  <a:pt x="779" y="63"/>
-                </a:lnTo>
-                <a:lnTo>
-                  <a:pt x="647" y="40"/>
-                </a:lnTo>
-                <a:lnTo>
-                  <a:pt x="510" y="23"/>
-                </a:lnTo>
-                <a:lnTo>
-                  <a:pt x="371" y="10"/>
-                </a:lnTo>
-                <a:lnTo>
-                  <a:pt x="231" y="2"/>
-                </a:lnTo>
-                <a:lnTo>
-                  <a:pt x="87" y="0"/>
-                </a:lnTo>
-                <a:lnTo>
-                  <a:pt x="0" y="0"/>
-                </a:lnTo>
-                <a:lnTo>
-                  <a:pt x="0" y="216"/>
-                </a:lnTo>
-                <a:lnTo>
-                  <a:pt x="30" y="215"/>
-                </a:lnTo>
-                <a:lnTo>
-                  <a:pt x="62" y="213"/>
-                </a:lnTo>
-                <a:lnTo>
-                  <a:pt x="92" y="212"/>
-                </a:lnTo>
-                <a:lnTo>
-                  <a:pt x="124" y="211"/>
-                </a:lnTo>
-                <a:lnTo>
-                  <a:pt x="0" y="575"/>
-                </a:lnTo>
-                <a:lnTo>
-                  <a:pt x="0" y="765"/>
-                </a:lnTo>
-                <a:lnTo>
-                  <a:pt x="189" y="211"/>
-                </a:lnTo>
-                <a:lnTo>
-                  <a:pt x="312" y="213"/>
-                </a:lnTo>
-                <a:lnTo>
-                  <a:pt x="434" y="221"/>
-                </a:lnTo>
-                <a:lnTo>
-                  <a:pt x="554" y="233"/>
-                </a:lnTo>
-                <a:lnTo>
-                  <a:pt x="673" y="250"/>
-                </a:lnTo>
-                <a:lnTo>
-                  <a:pt x="791" y="273"/>
-                </a:lnTo>
-                <a:lnTo>
-                  <a:pt x="906" y="299"/>
-                </a:lnTo>
-                <a:lnTo>
-                  <a:pt x="1019" y="331"/>
-                </a:lnTo>
-                <a:lnTo>
-                  <a:pt x="1132" y="366"/>
-                </a:lnTo>
-                <a:lnTo>
-                  <a:pt x="1240" y="407"/>
-                </a:lnTo>
-                <a:lnTo>
-                  <a:pt x="1348" y="451"/>
-                </a:lnTo>
-                <a:lnTo>
-                  <a:pt x="1454" y="499"/>
-                </a:lnTo>
-                <a:lnTo>
-                  <a:pt x="1556" y="551"/>
-                </a:lnTo>
-                <a:lnTo>
-                  <a:pt x="1657" y="607"/>
-                </a:lnTo>
-                <a:lnTo>
-                  <a:pt x="1756" y="668"/>
-                </a:lnTo>
-                <a:lnTo>
-                  <a:pt x="1852" y="731"/>
-                </a:lnTo>
-                <a:lnTo>
-                  <a:pt x="1945" y="799"/>
-                </a:lnTo>
-                <a:lnTo>
-                  <a:pt x="2035" y="870"/>
-                </a:lnTo>
-                <a:lnTo>
-                  <a:pt x="2123" y="945"/>
-                </a:lnTo>
-                <a:lnTo>
-                  <a:pt x="2208" y="1022"/>
-                </a:lnTo>
-                <a:lnTo>
-                  <a:pt x="2290" y="1104"/>
-                </a:lnTo>
-                <a:lnTo>
-                  <a:pt x="2369" y="1187"/>
-                </a:lnTo>
-                <a:lnTo>
-                  <a:pt x="2445" y="1274"/>
-                </a:lnTo>
-                <a:lnTo>
-                  <a:pt x="2517" y="1365"/>
-                </a:lnTo>
-                <a:lnTo>
-                  <a:pt x="2587" y="1457"/>
-                </a:lnTo>
-                <a:lnTo>
-                  <a:pt x="2654" y="1553"/>
-                </a:lnTo>
-                <a:lnTo>
-                  <a:pt x="2715" y="1652"/>
-                </a:lnTo>
-                <a:lnTo>
-                  <a:pt x="2775" y="1753"/>
-                </a:lnTo>
-                <a:lnTo>
-                  <a:pt x="2830" y="1857"/>
-                </a:lnTo>
-                <a:lnTo>
-                  <a:pt x="2883" y="1963"/>
-                </a:lnTo>
-                <a:lnTo>
-                  <a:pt x="2931" y="2070"/>
-                </a:lnTo>
-                <a:lnTo>
-                  <a:pt x="2976" y="2180"/>
-                </a:lnTo>
-                <a:lnTo>
-                  <a:pt x="3016" y="2292"/>
-                </a:lnTo>
-                <a:lnTo>
-                  <a:pt x="3020" y="2302"/>
-                </a:lnTo>
-                <a:lnTo>
-                  <a:pt x="3025" y="2311"/>
-                </a:lnTo>
-                <a:lnTo>
-                  <a:pt x="3030" y="2319"/>
-                </a:lnTo>
-                <a:lnTo>
-                  <a:pt x="3036" y="2328"/>
-                </a:lnTo>
-                <a:lnTo>
-                  <a:pt x="3064" y="2360"/>
-                </a:lnTo>
-                <a:lnTo>
-                  <a:pt x="3101" y="2402"/>
-                </a:lnTo>
-                <a:lnTo>
-                  <a:pt x="3135" y="2443"/>
-                </a:lnTo>
-                <a:lnTo>
-                  <a:pt x="3158" y="2468"/>
-                </a:lnTo>
-                <a:lnTo>
-                  <a:pt x="6930" y="13536"/>
-                </a:lnTo>
-                <a:lnTo>
-                  <a:pt x="6930" y="13554"/>
-                </a:lnTo>
-                <a:lnTo>
-                  <a:pt x="6929" y="13578"/>
-                </a:lnTo>
-                <a:lnTo>
-                  <a:pt x="6928" y="13604"/>
-                </a:lnTo>
-                <a:lnTo>
-                  <a:pt x="6926" y="13632"/>
-                </a:lnTo>
-                <a:lnTo>
-                  <a:pt x="6925" y="13661"/>
-                </a:lnTo>
-                <a:lnTo>
-                  <a:pt x="6924" y="13688"/>
-                </a:lnTo>
-                <a:lnTo>
-                  <a:pt x="6924" y="13712"/>
-                </a:lnTo>
-                <a:lnTo>
-                  <a:pt x="6923" y="13731"/>
-                </a:lnTo>
-                <a:lnTo>
-                  <a:pt x="6923" y="13739"/>
-                </a:lnTo>
-                <a:lnTo>
-                  <a:pt x="6924" y="13748"/>
-                </a:lnTo>
-                <a:lnTo>
-                  <a:pt x="6925" y="13758"/>
-                </a:lnTo>
-                <a:lnTo>
-                  <a:pt x="6928" y="13767"/>
-                </a:lnTo>
-                <a:lnTo>
-                  <a:pt x="6938" y="13795"/>
-                </a:lnTo>
-                <a:lnTo>
-                  <a:pt x="6945" y="13823"/>
-                </a:lnTo>
-                <a:lnTo>
-                  <a:pt x="6954" y="13852"/>
-                </a:lnTo>
-                <a:lnTo>
-                  <a:pt x="6962" y="13880"/>
-                </a:lnTo>
-                <a:lnTo>
-                  <a:pt x="6969" y="13907"/>
-                </a:lnTo>
-                <a:lnTo>
-                  <a:pt x="6976" y="13935"/>
-                </a:lnTo>
-                <a:lnTo>
-                  <a:pt x="6982" y="13964"/>
-                </a:lnTo>
-                <a:lnTo>
-                  <a:pt x="6988" y="13992"/>
-                </a:lnTo>
-                <a:lnTo>
-                  <a:pt x="7207" y="13992"/>
-                </a:lnTo>
-                <a:lnTo>
-                  <a:pt x="7200" y="13955"/>
-                </a:lnTo>
-                <a:lnTo>
-                  <a:pt x="7193" y="13919"/>
-                </a:lnTo>
-                <a:lnTo>
-                  <a:pt x="7184" y="13881"/>
-                </a:lnTo>
-                <a:lnTo>
-                  <a:pt x="7175" y="13844"/>
-                </a:lnTo>
-                <a:lnTo>
-                  <a:pt x="7165" y="13808"/>
-                </a:lnTo>
-                <a:lnTo>
-                  <a:pt x="7155" y="13771"/>
-                </a:lnTo>
-                <a:lnTo>
-                  <a:pt x="7144" y="13734"/>
-                </a:lnTo>
-                <a:lnTo>
-                  <a:pt x="7132" y="13698"/>
-                </a:lnTo>
-                <a:close/>
-              </a:path>
-            </a:pathLst>
-          </a:custGeom>
-          <a:solidFill>
-            <a:srgbClr val="253746"/>
-          </a:solidFill>
-          <a:ln w="9525">
-            <a:noFill/>
-            <a:round/>
-            <a:headEnd/>
-            <a:tailEnd/>
-          </a:ln>
-        </p:spPr>
-        <p:txBody>
-          <a:bodyPr vert="horz" wrap="square" lIns="91440" tIns="45720" rIns="91440" bIns="45720" numCol="1" anchor="t" anchorCtr="0" compatLnSpc="1">
-            <a:prstTxWarp prst="textNoShape">
-              <a:avLst/>
-            </a:prstTxWarp>
-          </a:bodyPr>
-          <a:lstStyle/>
-          <a:p>
-            <a:endParaRPr lang="pt-BR" sz="2100"/>
-          </a:p>
-        </p:txBody>
-      </p:sp>
-      <p:sp>
-        <p:nvSpPr>
-          <p:cNvPr id="1030" name="Freeform 6"/>
-          <p:cNvSpPr>
-            <a:spLocks noEditPoints="1"/>
-          </p:cNvSpPr>
-          <p:nvPr userDrawn="1"/>
-        </p:nvSpPr>
-        <p:spPr bwMode="auto">
-          <a:xfrm>
-            <a:off x="8655297" y="0"/>
-            <a:ext cx="4787655" cy="6313488"/>
-          </a:xfrm>
-          <a:custGeom>
-            <a:avLst/>
-            <a:gdLst/>
-            <a:ahLst/>
-            <a:cxnLst>
-              <a:cxn ang="0">
-                <a:pos x="92" y="1556"/>
-              </a:cxn>
-              <a:cxn ang="0">
-                <a:pos x="3050" y="10069"/>
-              </a:cxn>
-              <a:cxn ang="0">
-                <a:pos x="3043" y="10216"/>
-              </a:cxn>
-              <a:cxn ang="0">
-                <a:pos x="3119" y="10429"/>
-              </a:cxn>
-              <a:cxn ang="0">
-                <a:pos x="3347" y="10856"/>
-              </a:cxn>
-              <a:cxn ang="0">
-                <a:pos x="3644" y="11224"/>
-              </a:cxn>
-              <a:cxn ang="0">
-                <a:pos x="4004" y="11522"/>
-              </a:cxn>
-              <a:cxn ang="0">
-                <a:pos x="4424" y="11744"/>
-              </a:cxn>
-              <a:cxn ang="0">
-                <a:pos x="4899" y="11882"/>
-              </a:cxn>
-              <a:cxn ang="0">
-                <a:pos x="5426" y="11930"/>
-              </a:cxn>
-              <a:cxn ang="0">
-                <a:pos x="7072" y="11021"/>
-              </a:cxn>
-              <a:cxn ang="0">
-                <a:pos x="6837" y="11241"/>
-              </a:cxn>
-              <a:cxn ang="0">
-                <a:pos x="6574" y="11427"/>
-              </a:cxn>
-              <a:cxn ang="0">
-                <a:pos x="6289" y="11576"/>
-              </a:cxn>
-              <a:cxn ang="0">
-                <a:pos x="5983" y="11683"/>
-              </a:cxn>
-              <a:cxn ang="0">
-                <a:pos x="5663" y="11749"/>
-              </a:cxn>
-              <a:cxn ang="0">
-                <a:pos x="7155" y="6613"/>
-              </a:cxn>
-              <a:cxn ang="0">
-                <a:pos x="7198" y="6270"/>
-              </a:cxn>
-              <a:cxn ang="0">
-                <a:pos x="7149" y="6477"/>
-              </a:cxn>
-              <a:cxn ang="0">
-                <a:pos x="5254" y="11768"/>
-              </a:cxn>
-              <a:cxn ang="0">
-                <a:pos x="4805" y="11702"/>
-              </a:cxn>
-              <a:cxn ang="0">
-                <a:pos x="4388" y="11551"/>
-              </a:cxn>
-              <a:cxn ang="0">
-                <a:pos x="4015" y="11323"/>
-              </a:cxn>
-              <a:cxn ang="0">
-                <a:pos x="3693" y="11028"/>
-              </a:cxn>
-              <a:cxn ang="0">
-                <a:pos x="3430" y="10675"/>
-              </a:cxn>
-              <a:cxn ang="0">
-                <a:pos x="3232" y="10274"/>
-              </a:cxn>
-              <a:cxn ang="0">
-                <a:pos x="3187" y="10163"/>
-              </a:cxn>
-              <a:cxn ang="0">
-                <a:pos x="230" y="1652"/>
-              </a:cxn>
-              <a:cxn ang="0">
-                <a:pos x="236" y="1498"/>
-              </a:cxn>
-              <a:cxn ang="0">
-                <a:pos x="210" y="1403"/>
-              </a:cxn>
-              <a:cxn ang="0">
-                <a:pos x="173" y="1220"/>
-              </a:cxn>
-              <a:cxn ang="0">
-                <a:pos x="164" y="1036"/>
-              </a:cxn>
-              <a:cxn ang="0">
-                <a:pos x="182" y="854"/>
-              </a:cxn>
-              <a:cxn ang="0">
-                <a:pos x="229" y="676"/>
-              </a:cxn>
-              <a:cxn ang="0">
-                <a:pos x="301" y="505"/>
-              </a:cxn>
-              <a:cxn ang="0">
-                <a:pos x="399" y="344"/>
-              </a:cxn>
-              <a:cxn ang="0">
-                <a:pos x="500" y="219"/>
-              </a:cxn>
-              <a:cxn ang="0">
-                <a:pos x="615" y="110"/>
-              </a:cxn>
-              <a:cxn ang="0">
-                <a:pos x="742" y="16"/>
-              </a:cxn>
-              <a:cxn ang="0">
-                <a:pos x="402" y="86"/>
-              </a:cxn>
-              <a:cxn ang="0">
-                <a:pos x="267" y="249"/>
-              </a:cxn>
-              <a:cxn ang="0">
-                <a:pos x="154" y="432"/>
-              </a:cxn>
-              <a:cxn ang="0">
-                <a:pos x="73" y="624"/>
-              </a:cxn>
-              <a:cxn ang="0">
-                <a:pos x="22" y="825"/>
-              </a:cxn>
-              <a:cxn ang="0">
-                <a:pos x="0" y="1031"/>
-              </a:cxn>
-              <a:cxn ang="0">
-                <a:pos x="10" y="1239"/>
-              </a:cxn>
-              <a:cxn ang="0">
-                <a:pos x="52" y="1447"/>
-              </a:cxn>
-              <a:cxn ang="0">
-                <a:pos x="7188" y="5091"/>
-              </a:cxn>
-              <a:cxn ang="0">
-                <a:pos x="5406" y="0"/>
-              </a:cxn>
-              <a:cxn ang="0">
-                <a:pos x="7160" y="5166"/>
-              </a:cxn>
-              <a:cxn ang="0">
-                <a:pos x="7198" y="717"/>
-              </a:cxn>
-              <a:cxn ang="0">
-                <a:pos x="6453" y="96"/>
-              </a:cxn>
-              <a:cxn ang="0">
-                <a:pos x="6770" y="298"/>
-              </a:cxn>
-              <a:cxn ang="0">
-                <a:pos x="7049" y="547"/>
-              </a:cxn>
-            </a:cxnLst>
-            <a:rect l="0" t="0" r="r" b="b"/>
-            <a:pathLst>
-              <a:path w="7198" h="11930">
-                <a:moveTo>
-                  <a:pt x="77" y="1530"/>
-                </a:moveTo>
-                <a:lnTo>
-                  <a:pt x="81" y="1537"/>
-                </a:lnTo>
-                <a:lnTo>
-                  <a:pt x="84" y="1543"/>
-                </a:lnTo>
-                <a:lnTo>
-                  <a:pt x="89" y="1550"/>
-                </a:lnTo>
-                <a:lnTo>
-                  <a:pt x="92" y="1556"/>
-                </a:lnTo>
-                <a:lnTo>
-                  <a:pt x="114" y="1583"/>
-                </a:lnTo>
-                <a:lnTo>
-                  <a:pt x="143" y="1617"/>
-                </a:lnTo>
-                <a:lnTo>
-                  <a:pt x="169" y="1650"/>
-                </a:lnTo>
-                <a:lnTo>
-                  <a:pt x="187" y="1671"/>
-                </a:lnTo>
-                <a:lnTo>
-                  <a:pt x="3050" y="10069"/>
-                </a:lnTo>
-                <a:lnTo>
-                  <a:pt x="3049" y="10097"/>
-                </a:lnTo>
-                <a:lnTo>
-                  <a:pt x="3047" y="10136"/>
-                </a:lnTo>
-                <a:lnTo>
-                  <a:pt x="3045" y="10175"/>
-                </a:lnTo>
-                <a:lnTo>
-                  <a:pt x="3044" y="10207"/>
-                </a:lnTo>
-                <a:lnTo>
-                  <a:pt x="3043" y="10216"/>
-                </a:lnTo>
-                <a:lnTo>
-                  <a:pt x="3044" y="10224"/>
-                </a:lnTo>
-                <a:lnTo>
-                  <a:pt x="3045" y="10233"/>
-                </a:lnTo>
-                <a:lnTo>
-                  <a:pt x="3048" y="10242"/>
-                </a:lnTo>
-                <a:lnTo>
-                  <a:pt x="3082" y="10336"/>
-                </a:lnTo>
-                <a:lnTo>
-                  <a:pt x="3119" y="10429"/>
-                </a:lnTo>
-                <a:lnTo>
-                  <a:pt x="3158" y="10519"/>
-                </a:lnTo>
-                <a:lnTo>
-                  <a:pt x="3201" y="10607"/>
-                </a:lnTo>
-                <a:lnTo>
-                  <a:pt x="3247" y="10692"/>
-                </a:lnTo>
-                <a:lnTo>
-                  <a:pt x="3295" y="10775"/>
-                </a:lnTo>
-                <a:lnTo>
-                  <a:pt x="3347" y="10856"/>
-                </a:lnTo>
-                <a:lnTo>
-                  <a:pt x="3400" y="10936"/>
-                </a:lnTo>
-                <a:lnTo>
-                  <a:pt x="3457" y="11011"/>
-                </a:lnTo>
-                <a:lnTo>
-                  <a:pt x="3516" y="11085"/>
-                </a:lnTo>
-                <a:lnTo>
-                  <a:pt x="3578" y="11155"/>
-                </a:lnTo>
-                <a:lnTo>
-                  <a:pt x="3644" y="11224"/>
-                </a:lnTo>
-                <a:lnTo>
-                  <a:pt x="3711" y="11289"/>
-                </a:lnTo>
-                <a:lnTo>
-                  <a:pt x="3780" y="11351"/>
-                </a:lnTo>
-                <a:lnTo>
-                  <a:pt x="3852" y="11410"/>
-                </a:lnTo>
-                <a:lnTo>
-                  <a:pt x="3927" y="11467"/>
-                </a:lnTo>
-                <a:lnTo>
-                  <a:pt x="4004" y="11522"/>
-                </a:lnTo>
-                <a:lnTo>
-                  <a:pt x="4083" y="11572"/>
-                </a:lnTo>
-                <a:lnTo>
-                  <a:pt x="4166" y="11620"/>
-                </a:lnTo>
-                <a:lnTo>
-                  <a:pt x="4250" y="11664"/>
-                </a:lnTo>
-                <a:lnTo>
-                  <a:pt x="4336" y="11706"/>
-                </a:lnTo>
-                <a:lnTo>
-                  <a:pt x="4424" y="11744"/>
-                </a:lnTo>
-                <a:lnTo>
-                  <a:pt x="4515" y="11778"/>
-                </a:lnTo>
-                <a:lnTo>
-                  <a:pt x="4609" y="11810"/>
-                </a:lnTo>
-                <a:lnTo>
-                  <a:pt x="4704" y="11837"/>
-                </a:lnTo>
-                <a:lnTo>
-                  <a:pt x="4801" y="11861"/>
-                </a:lnTo>
-                <a:lnTo>
-                  <a:pt x="4899" y="11882"/>
-                </a:lnTo>
-                <a:lnTo>
-                  <a:pt x="5002" y="11899"/>
-                </a:lnTo>
-                <a:lnTo>
-                  <a:pt x="5104" y="11912"/>
-                </a:lnTo>
-                <a:lnTo>
-                  <a:pt x="5210" y="11922"/>
-                </a:lnTo>
-                <a:lnTo>
-                  <a:pt x="5316" y="11928"/>
-                </a:lnTo>
-                <a:lnTo>
-                  <a:pt x="5426" y="11930"/>
-                </a:lnTo>
-                <a:lnTo>
-                  <a:pt x="7198" y="11930"/>
-                </a:lnTo>
-                <a:lnTo>
-                  <a:pt x="7198" y="10874"/>
-                </a:lnTo>
-                <a:lnTo>
-                  <a:pt x="7158" y="10924"/>
-                </a:lnTo>
-                <a:lnTo>
-                  <a:pt x="7115" y="10973"/>
-                </a:lnTo>
-                <a:lnTo>
-                  <a:pt x="7072" y="11021"/>
-                </a:lnTo>
-                <a:lnTo>
-                  <a:pt x="7027" y="11068"/>
-                </a:lnTo>
-                <a:lnTo>
-                  <a:pt x="6981" y="11114"/>
-                </a:lnTo>
-                <a:lnTo>
-                  <a:pt x="6934" y="11157"/>
-                </a:lnTo>
-                <a:lnTo>
-                  <a:pt x="6886" y="11200"/>
-                </a:lnTo>
-                <a:lnTo>
-                  <a:pt x="6837" y="11241"/>
-                </a:lnTo>
-                <a:lnTo>
-                  <a:pt x="6786" y="11282"/>
-                </a:lnTo>
-                <a:lnTo>
-                  <a:pt x="6734" y="11320"/>
-                </a:lnTo>
-                <a:lnTo>
-                  <a:pt x="6683" y="11357"/>
-                </a:lnTo>
-                <a:lnTo>
-                  <a:pt x="6628" y="11393"/>
-                </a:lnTo>
-                <a:lnTo>
-                  <a:pt x="6574" y="11427"/>
-                </a:lnTo>
-                <a:lnTo>
-                  <a:pt x="6519" y="11460"/>
-                </a:lnTo>
-                <a:lnTo>
-                  <a:pt x="6463" y="11491"/>
-                </a:lnTo>
-                <a:lnTo>
-                  <a:pt x="6406" y="11520"/>
-                </a:lnTo>
-                <a:lnTo>
-                  <a:pt x="6348" y="11549"/>
-                </a:lnTo>
-                <a:lnTo>
-                  <a:pt x="6289" y="11576"/>
-                </a:lnTo>
-                <a:lnTo>
-                  <a:pt x="6229" y="11600"/>
-                </a:lnTo>
-                <a:lnTo>
-                  <a:pt x="6169" y="11624"/>
-                </a:lnTo>
-                <a:lnTo>
-                  <a:pt x="6108" y="11645"/>
-                </a:lnTo>
-                <a:lnTo>
-                  <a:pt x="6046" y="11666"/>
-                </a:lnTo>
-                <a:lnTo>
-                  <a:pt x="5983" y="11683"/>
-                </a:lnTo>
-                <a:lnTo>
-                  <a:pt x="5921" y="11700"/>
-                </a:lnTo>
-                <a:lnTo>
-                  <a:pt x="5857" y="11715"/>
-                </a:lnTo>
-                <a:lnTo>
-                  <a:pt x="5792" y="11729"/>
-                </a:lnTo>
-                <a:lnTo>
-                  <a:pt x="5728" y="11740"/>
-                </a:lnTo>
-                <a:lnTo>
-                  <a:pt x="5663" y="11749"/>
-                </a:lnTo>
-                <a:lnTo>
-                  <a:pt x="5598" y="11757"/>
-                </a:lnTo>
-                <a:lnTo>
-                  <a:pt x="5531" y="11763"/>
-                </a:lnTo>
-                <a:lnTo>
-                  <a:pt x="5465" y="11767"/>
-                </a:lnTo>
-                <a:lnTo>
-                  <a:pt x="5398" y="11769"/>
-                </a:lnTo>
-                <a:lnTo>
-                  <a:pt x="7155" y="6613"/>
-                </a:lnTo>
-                <a:lnTo>
-                  <a:pt x="7166" y="6579"/>
-                </a:lnTo>
-                <a:lnTo>
-                  <a:pt x="7178" y="6544"/>
-                </a:lnTo>
-                <a:lnTo>
-                  <a:pt x="7188" y="6510"/>
-                </a:lnTo>
-                <a:lnTo>
-                  <a:pt x="7198" y="6474"/>
-                </a:lnTo>
-                <a:lnTo>
-                  <a:pt x="7198" y="6270"/>
-                </a:lnTo>
-                <a:lnTo>
-                  <a:pt x="7189" y="6312"/>
-                </a:lnTo>
-                <a:lnTo>
-                  <a:pt x="7180" y="6353"/>
-                </a:lnTo>
-                <a:lnTo>
-                  <a:pt x="7170" y="6395"/>
-                </a:lnTo>
-                <a:lnTo>
-                  <a:pt x="7160" y="6435"/>
-                </a:lnTo>
-                <a:lnTo>
-                  <a:pt x="7149" y="6477"/>
-                </a:lnTo>
-                <a:lnTo>
-                  <a:pt x="7137" y="6517"/>
-                </a:lnTo>
-                <a:lnTo>
-                  <a:pt x="7125" y="6558"/>
-                </a:lnTo>
-                <a:lnTo>
-                  <a:pt x="7111" y="6598"/>
-                </a:lnTo>
-                <a:lnTo>
-                  <a:pt x="5348" y="11769"/>
-                </a:lnTo>
-                <a:lnTo>
-                  <a:pt x="5254" y="11768"/>
-                </a:lnTo>
-                <a:lnTo>
-                  <a:pt x="5162" y="11762"/>
-                </a:lnTo>
-                <a:lnTo>
-                  <a:pt x="5071" y="11753"/>
-                </a:lnTo>
-                <a:lnTo>
-                  <a:pt x="4980" y="11739"/>
-                </a:lnTo>
-                <a:lnTo>
-                  <a:pt x="4892" y="11722"/>
-                </a:lnTo>
-                <a:lnTo>
-                  <a:pt x="4805" y="11702"/>
-                </a:lnTo>
-                <a:lnTo>
-                  <a:pt x="4717" y="11678"/>
-                </a:lnTo>
-                <a:lnTo>
-                  <a:pt x="4633" y="11652"/>
-                </a:lnTo>
-                <a:lnTo>
-                  <a:pt x="4549" y="11621"/>
-                </a:lnTo>
-                <a:lnTo>
-                  <a:pt x="4469" y="11587"/>
-                </a:lnTo>
-                <a:lnTo>
-                  <a:pt x="4388" y="11551"/>
-                </a:lnTo>
-                <a:lnTo>
-                  <a:pt x="4310" y="11512"/>
-                </a:lnTo>
-                <a:lnTo>
-                  <a:pt x="4234" y="11469"/>
-                </a:lnTo>
-                <a:lnTo>
-                  <a:pt x="4159" y="11423"/>
-                </a:lnTo>
-                <a:lnTo>
-                  <a:pt x="4086" y="11374"/>
-                </a:lnTo>
-                <a:lnTo>
-                  <a:pt x="4015" y="11323"/>
-                </a:lnTo>
-                <a:lnTo>
-                  <a:pt x="3947" y="11269"/>
-                </a:lnTo>
-                <a:lnTo>
-                  <a:pt x="3880" y="11212"/>
-                </a:lnTo>
-                <a:lnTo>
-                  <a:pt x="3816" y="11153"/>
-                </a:lnTo>
-                <a:lnTo>
-                  <a:pt x="3754" y="11092"/>
-                </a:lnTo>
-                <a:lnTo>
-                  <a:pt x="3693" y="11028"/>
-                </a:lnTo>
-                <a:lnTo>
-                  <a:pt x="3636" y="10962"/>
-                </a:lnTo>
-                <a:lnTo>
-                  <a:pt x="3581" y="10893"/>
-                </a:lnTo>
-                <a:lnTo>
-                  <a:pt x="3528" y="10822"/>
-                </a:lnTo>
-                <a:lnTo>
-                  <a:pt x="3477" y="10750"/>
-                </a:lnTo>
-                <a:lnTo>
-                  <a:pt x="3430" y="10675"/>
-                </a:lnTo>
-                <a:lnTo>
-                  <a:pt x="3385" y="10598"/>
-                </a:lnTo>
-                <a:lnTo>
-                  <a:pt x="3342" y="10520"/>
-                </a:lnTo>
-                <a:lnTo>
-                  <a:pt x="3303" y="10439"/>
-                </a:lnTo>
-                <a:lnTo>
-                  <a:pt x="3266" y="10357"/>
-                </a:lnTo>
-                <a:lnTo>
-                  <a:pt x="3232" y="10274"/>
-                </a:lnTo>
-                <a:lnTo>
-                  <a:pt x="3202" y="10189"/>
-                </a:lnTo>
-                <a:lnTo>
-                  <a:pt x="3199" y="10182"/>
-                </a:lnTo>
-                <a:lnTo>
-                  <a:pt x="3196" y="10175"/>
-                </a:lnTo>
-                <a:lnTo>
-                  <a:pt x="3192" y="10169"/>
-                </a:lnTo>
-                <a:lnTo>
-                  <a:pt x="3187" y="10163"/>
-                </a:lnTo>
-                <a:lnTo>
-                  <a:pt x="3165" y="10137"/>
-                </a:lnTo>
-                <a:lnTo>
-                  <a:pt x="3137" y="10106"/>
-                </a:lnTo>
-                <a:lnTo>
-                  <a:pt x="3112" y="10075"/>
-                </a:lnTo>
-                <a:lnTo>
-                  <a:pt x="3095" y="10055"/>
-                </a:lnTo>
-                <a:lnTo>
-                  <a:pt x="230" y="1652"/>
-                </a:lnTo>
-                <a:lnTo>
-                  <a:pt x="231" y="1621"/>
-                </a:lnTo>
-                <a:lnTo>
-                  <a:pt x="234" y="1580"/>
-                </a:lnTo>
-                <a:lnTo>
-                  <a:pt x="235" y="1537"/>
-                </a:lnTo>
-                <a:lnTo>
-                  <a:pt x="236" y="1506"/>
-                </a:lnTo>
-                <a:lnTo>
-                  <a:pt x="236" y="1498"/>
-                </a:lnTo>
-                <a:lnTo>
-                  <a:pt x="235" y="1490"/>
-                </a:lnTo>
-                <a:lnTo>
-                  <a:pt x="234" y="1484"/>
-                </a:lnTo>
-                <a:lnTo>
-                  <a:pt x="233" y="1477"/>
-                </a:lnTo>
-                <a:lnTo>
-                  <a:pt x="220" y="1440"/>
-                </a:lnTo>
-                <a:lnTo>
-                  <a:pt x="210" y="1403"/>
-                </a:lnTo>
-                <a:lnTo>
-                  <a:pt x="200" y="1368"/>
-                </a:lnTo>
-                <a:lnTo>
-                  <a:pt x="192" y="1330"/>
-                </a:lnTo>
-                <a:lnTo>
-                  <a:pt x="185" y="1293"/>
-                </a:lnTo>
-                <a:lnTo>
-                  <a:pt x="178" y="1257"/>
-                </a:lnTo>
-                <a:lnTo>
-                  <a:pt x="173" y="1220"/>
-                </a:lnTo>
-                <a:lnTo>
-                  <a:pt x="169" y="1183"/>
-                </a:lnTo>
-                <a:lnTo>
-                  <a:pt x="166" y="1147"/>
-                </a:lnTo>
-                <a:lnTo>
-                  <a:pt x="164" y="1109"/>
-                </a:lnTo>
-                <a:lnTo>
-                  <a:pt x="163" y="1072"/>
-                </a:lnTo>
-                <a:lnTo>
-                  <a:pt x="164" y="1036"/>
-                </a:lnTo>
-                <a:lnTo>
-                  <a:pt x="166" y="999"/>
-                </a:lnTo>
-                <a:lnTo>
-                  <a:pt x="168" y="962"/>
-                </a:lnTo>
-                <a:lnTo>
-                  <a:pt x="172" y="926"/>
-                </a:lnTo>
-                <a:lnTo>
-                  <a:pt x="177" y="890"/>
-                </a:lnTo>
-                <a:lnTo>
-                  <a:pt x="182" y="854"/>
-                </a:lnTo>
-                <a:lnTo>
-                  <a:pt x="190" y="818"/>
-                </a:lnTo>
-                <a:lnTo>
-                  <a:pt x="197" y="782"/>
-                </a:lnTo>
-                <a:lnTo>
-                  <a:pt x="207" y="746"/>
-                </a:lnTo>
-                <a:lnTo>
-                  <a:pt x="217" y="711"/>
-                </a:lnTo>
-                <a:lnTo>
-                  <a:pt x="229" y="676"/>
-                </a:lnTo>
-                <a:lnTo>
-                  <a:pt x="240" y="642"/>
-                </a:lnTo>
-                <a:lnTo>
-                  <a:pt x="254" y="608"/>
-                </a:lnTo>
-                <a:lnTo>
-                  <a:pt x="268" y="572"/>
-                </a:lnTo>
-                <a:lnTo>
-                  <a:pt x="284" y="539"/>
-                </a:lnTo>
-                <a:lnTo>
-                  <a:pt x="301" y="505"/>
-                </a:lnTo>
-                <a:lnTo>
-                  <a:pt x="318" y="472"/>
-                </a:lnTo>
-                <a:lnTo>
-                  <a:pt x="336" y="440"/>
-                </a:lnTo>
-                <a:lnTo>
-                  <a:pt x="356" y="408"/>
-                </a:lnTo>
-                <a:lnTo>
-                  <a:pt x="377" y="375"/>
-                </a:lnTo>
-                <a:lnTo>
-                  <a:pt x="399" y="344"/>
-                </a:lnTo>
-                <a:lnTo>
-                  <a:pt x="418" y="318"/>
-                </a:lnTo>
-                <a:lnTo>
-                  <a:pt x="438" y="292"/>
-                </a:lnTo>
-                <a:lnTo>
-                  <a:pt x="459" y="267"/>
-                </a:lnTo>
-                <a:lnTo>
-                  <a:pt x="479" y="243"/>
-                </a:lnTo>
-                <a:lnTo>
-                  <a:pt x="500" y="219"/>
-                </a:lnTo>
-                <a:lnTo>
-                  <a:pt x="523" y="196"/>
-                </a:lnTo>
-                <a:lnTo>
-                  <a:pt x="546" y="173"/>
-                </a:lnTo>
-                <a:lnTo>
-                  <a:pt x="569" y="152"/>
-                </a:lnTo>
-                <a:lnTo>
-                  <a:pt x="591" y="130"/>
-                </a:lnTo>
-                <a:lnTo>
-                  <a:pt x="615" y="110"/>
-                </a:lnTo>
-                <a:lnTo>
-                  <a:pt x="641" y="90"/>
-                </a:lnTo>
-                <a:lnTo>
-                  <a:pt x="665" y="71"/>
-                </a:lnTo>
-                <a:lnTo>
-                  <a:pt x="690" y="52"/>
-                </a:lnTo>
-                <a:lnTo>
-                  <a:pt x="715" y="34"/>
-                </a:lnTo>
-                <a:lnTo>
-                  <a:pt x="742" y="16"/>
-                </a:lnTo>
-                <a:lnTo>
-                  <a:pt x="768" y="0"/>
-                </a:lnTo>
-                <a:lnTo>
-                  <a:pt x="491" y="0"/>
-                </a:lnTo>
-                <a:lnTo>
-                  <a:pt x="461" y="28"/>
-                </a:lnTo>
-                <a:lnTo>
-                  <a:pt x="431" y="57"/>
-                </a:lnTo>
-                <a:lnTo>
-                  <a:pt x="402" y="86"/>
-                </a:lnTo>
-                <a:lnTo>
-                  <a:pt x="373" y="116"/>
-                </a:lnTo>
-                <a:lnTo>
-                  <a:pt x="345" y="149"/>
-                </a:lnTo>
-                <a:lnTo>
-                  <a:pt x="317" y="181"/>
-                </a:lnTo>
-                <a:lnTo>
-                  <a:pt x="292" y="215"/>
-                </a:lnTo>
-                <a:lnTo>
-                  <a:pt x="267" y="249"/>
-                </a:lnTo>
-                <a:lnTo>
-                  <a:pt x="241" y="284"/>
-                </a:lnTo>
-                <a:lnTo>
-                  <a:pt x="217" y="321"/>
-                </a:lnTo>
-                <a:lnTo>
-                  <a:pt x="196" y="357"/>
-                </a:lnTo>
-                <a:lnTo>
-                  <a:pt x="174" y="394"/>
-                </a:lnTo>
-                <a:lnTo>
-                  <a:pt x="154" y="432"/>
-                </a:lnTo>
-                <a:lnTo>
-                  <a:pt x="137" y="470"/>
-                </a:lnTo>
-                <a:lnTo>
-                  <a:pt x="119" y="508"/>
-                </a:lnTo>
-                <a:lnTo>
-                  <a:pt x="102" y="546"/>
-                </a:lnTo>
-                <a:lnTo>
-                  <a:pt x="87" y="585"/>
-                </a:lnTo>
-                <a:lnTo>
-                  <a:pt x="73" y="624"/>
-                </a:lnTo>
-                <a:lnTo>
-                  <a:pt x="61" y="664"/>
-                </a:lnTo>
-                <a:lnTo>
-                  <a:pt x="49" y="704"/>
-                </a:lnTo>
-                <a:lnTo>
-                  <a:pt x="38" y="744"/>
-                </a:lnTo>
-                <a:lnTo>
-                  <a:pt x="29" y="784"/>
-                </a:lnTo>
-                <a:lnTo>
-                  <a:pt x="22" y="825"/>
-                </a:lnTo>
-                <a:lnTo>
-                  <a:pt x="15" y="866"/>
-                </a:lnTo>
-                <a:lnTo>
-                  <a:pt x="9" y="907"/>
-                </a:lnTo>
-                <a:lnTo>
-                  <a:pt x="5" y="949"/>
-                </a:lnTo>
-                <a:lnTo>
-                  <a:pt x="3" y="990"/>
-                </a:lnTo>
-                <a:lnTo>
-                  <a:pt x="0" y="1031"/>
-                </a:lnTo>
-                <a:lnTo>
-                  <a:pt x="0" y="1072"/>
-                </a:lnTo>
-                <a:lnTo>
-                  <a:pt x="1" y="1114"/>
-                </a:lnTo>
-                <a:lnTo>
-                  <a:pt x="3" y="1156"/>
-                </a:lnTo>
-                <a:lnTo>
-                  <a:pt x="6" y="1197"/>
-                </a:lnTo>
-                <a:lnTo>
-                  <a:pt x="10" y="1239"/>
-                </a:lnTo>
-                <a:lnTo>
-                  <a:pt x="17" y="1281"/>
-                </a:lnTo>
-                <a:lnTo>
-                  <a:pt x="23" y="1322"/>
-                </a:lnTo>
-                <a:lnTo>
-                  <a:pt x="32" y="1364"/>
-                </a:lnTo>
-                <a:lnTo>
-                  <a:pt x="42" y="1406"/>
-                </a:lnTo>
-                <a:lnTo>
-                  <a:pt x="52" y="1447"/>
-                </a:lnTo>
-                <a:lnTo>
-                  <a:pt x="65" y="1488"/>
-                </a:lnTo>
-                <a:lnTo>
-                  <a:pt x="77" y="1530"/>
-                </a:lnTo>
-                <a:close/>
-                <a:moveTo>
-                  <a:pt x="7198" y="5331"/>
-                </a:moveTo>
-                <a:lnTo>
-                  <a:pt x="7198" y="5127"/>
-                </a:lnTo>
-                <a:lnTo>
-                  <a:pt x="7188" y="5091"/>
-                </a:lnTo>
-                <a:lnTo>
-                  <a:pt x="7178" y="5057"/>
-                </a:lnTo>
-                <a:lnTo>
-                  <a:pt x="7166" y="5023"/>
-                </a:lnTo>
-                <a:lnTo>
-                  <a:pt x="7155" y="4988"/>
-                </a:lnTo>
-                <a:lnTo>
-                  <a:pt x="5455" y="0"/>
-                </a:lnTo>
-                <a:lnTo>
-                  <a:pt x="5406" y="0"/>
-                </a:lnTo>
-                <a:lnTo>
-                  <a:pt x="7111" y="5003"/>
-                </a:lnTo>
-                <a:lnTo>
-                  <a:pt x="7125" y="5043"/>
-                </a:lnTo>
-                <a:lnTo>
-                  <a:pt x="7137" y="5084"/>
-                </a:lnTo>
-                <a:lnTo>
-                  <a:pt x="7149" y="5125"/>
-                </a:lnTo>
-                <a:lnTo>
-                  <a:pt x="7160" y="5166"/>
-                </a:lnTo>
-                <a:lnTo>
-                  <a:pt x="7170" y="5208"/>
-                </a:lnTo>
-                <a:lnTo>
-                  <a:pt x="7180" y="5248"/>
-                </a:lnTo>
-                <a:lnTo>
-                  <a:pt x="7189" y="5290"/>
-                </a:lnTo>
-                <a:lnTo>
-                  <a:pt x="7198" y="5331"/>
-                </a:lnTo>
-                <a:close/>
-                <a:moveTo>
-                  <a:pt x="7198" y="717"/>
-                </a:moveTo>
-                <a:lnTo>
-                  <a:pt x="7198" y="0"/>
-                </a:lnTo>
-                <a:lnTo>
-                  <a:pt x="6249" y="0"/>
-                </a:lnTo>
-                <a:lnTo>
-                  <a:pt x="6319" y="30"/>
-                </a:lnTo>
-                <a:lnTo>
-                  <a:pt x="6386" y="62"/>
-                </a:lnTo>
-                <a:lnTo>
-                  <a:pt x="6453" y="96"/>
-                </a:lnTo>
-                <a:lnTo>
-                  <a:pt x="6519" y="133"/>
-                </a:lnTo>
-                <a:lnTo>
-                  <a:pt x="6584" y="171"/>
-                </a:lnTo>
-                <a:lnTo>
-                  <a:pt x="6647" y="211"/>
-                </a:lnTo>
-                <a:lnTo>
-                  <a:pt x="6709" y="254"/>
-                </a:lnTo>
-                <a:lnTo>
-                  <a:pt x="6770" y="298"/>
-                </a:lnTo>
-                <a:lnTo>
-                  <a:pt x="6828" y="344"/>
-                </a:lnTo>
-                <a:lnTo>
-                  <a:pt x="6886" y="392"/>
-                </a:lnTo>
-                <a:lnTo>
-                  <a:pt x="6942" y="442"/>
-                </a:lnTo>
-                <a:lnTo>
-                  <a:pt x="6997" y="494"/>
-                </a:lnTo>
-                <a:lnTo>
-                  <a:pt x="7049" y="547"/>
-                </a:lnTo>
-                <a:lnTo>
-                  <a:pt x="7101" y="602"/>
-                </a:lnTo>
-                <a:lnTo>
-                  <a:pt x="7150" y="659"/>
-                </a:lnTo>
-                <a:lnTo>
-                  <a:pt x="7198" y="717"/>
-                </a:lnTo>
-                <a:close/>
-              </a:path>
-            </a:pathLst>
-          </a:custGeom>
-          <a:solidFill>
-            <a:srgbClr val="253746"/>
-          </a:solidFill>
-          <a:ln w="9525">
-            <a:noFill/>
-            <a:round/>
-            <a:headEnd/>
-            <a:tailEnd/>
-          </a:ln>
-        </p:spPr>
-        <p:txBody>
-          <a:bodyPr vert="horz" wrap="square" lIns="91440" tIns="45720" rIns="91440" bIns="45720" numCol="1" anchor="t" anchorCtr="0" compatLnSpc="1">
-            <a:prstTxWarp prst="textNoShape">
-              <a:avLst/>
-            </a:prstTxWarp>
-          </a:bodyPr>
-          <a:lstStyle/>
-          <a:p>
-            <a:endParaRPr lang="pt-BR" sz="2100"/>
-          </a:p>
-        </p:txBody>
-      </p:sp>
-      <p:sp>
-        <p:nvSpPr>
-          <p:cNvPr id="1031" name="Freeform 7"/>
-          <p:cNvSpPr>
-            <a:spLocks/>
-          </p:cNvSpPr>
-          <p:nvPr userDrawn="1"/>
-        </p:nvSpPr>
-        <p:spPr bwMode="auto">
-          <a:xfrm>
-            <a:off x="0" y="3408363"/>
-            <a:ext cx="3911547" cy="4152900"/>
-          </a:xfrm>
-          <a:custGeom>
-            <a:avLst/>
-            <a:gdLst/>
-            <a:ahLst/>
-            <a:cxnLst>
-              <a:cxn ang="0">
-                <a:pos x="5879" y="7847"/>
-              </a:cxn>
-              <a:cxn ang="0">
-                <a:pos x="5867" y="7764"/>
-              </a:cxn>
-              <a:cxn ang="0">
-                <a:pos x="5851" y="7682"/>
-              </a:cxn>
-              <a:cxn ang="0">
-                <a:pos x="5835" y="7599"/>
-              </a:cxn>
-              <a:cxn ang="0">
-                <a:pos x="5816" y="7517"/>
-              </a:cxn>
-              <a:cxn ang="0">
-                <a:pos x="5796" y="7437"/>
-              </a:cxn>
-              <a:cxn ang="0">
-                <a:pos x="5773" y="7356"/>
-              </a:cxn>
-              <a:cxn ang="0">
-                <a:pos x="5748" y="7275"/>
-              </a:cxn>
-              <a:cxn ang="0">
-                <a:pos x="5721" y="7195"/>
-              </a:cxn>
-              <a:cxn ang="0">
-                <a:pos x="3999" y="2278"/>
-              </a:cxn>
-              <a:cxn ang="0">
-                <a:pos x="3952" y="2152"/>
-              </a:cxn>
-              <a:cxn ang="0">
-                <a:pos x="3900" y="2028"/>
-              </a:cxn>
-              <a:cxn ang="0">
-                <a:pos x="3843" y="1907"/>
-              </a:cxn>
-              <a:cxn ang="0">
-                <a:pos x="3783" y="1789"/>
-              </a:cxn>
-              <a:cxn ang="0">
-                <a:pos x="3718" y="1674"/>
-              </a:cxn>
-              <a:cxn ang="0">
-                <a:pos x="3649" y="1562"/>
-              </a:cxn>
-              <a:cxn ang="0">
-                <a:pos x="3576" y="1453"/>
-              </a:cxn>
-              <a:cxn ang="0">
-                <a:pos x="3499" y="1347"/>
-              </a:cxn>
-              <a:cxn ang="0">
-                <a:pos x="3418" y="1245"/>
-              </a:cxn>
-              <a:cxn ang="0">
-                <a:pos x="3333" y="1146"/>
-              </a:cxn>
-              <a:cxn ang="0">
-                <a:pos x="3245" y="1050"/>
-              </a:cxn>
-              <a:cxn ang="0">
-                <a:pos x="3152" y="958"/>
-              </a:cxn>
-              <a:cxn ang="0">
-                <a:pos x="3058" y="870"/>
-              </a:cxn>
-              <a:cxn ang="0">
-                <a:pos x="2960" y="785"/>
-              </a:cxn>
-              <a:cxn ang="0">
-                <a:pos x="2858" y="704"/>
-              </a:cxn>
-              <a:cxn ang="0">
-                <a:pos x="2755" y="629"/>
-              </a:cxn>
-              <a:cxn ang="0">
-                <a:pos x="2647" y="555"/>
-              </a:cxn>
-              <a:cxn ang="0">
-                <a:pos x="2537" y="486"/>
-              </a:cxn>
-              <a:cxn ang="0">
-                <a:pos x="2426" y="421"/>
-              </a:cxn>
-              <a:cxn ang="0">
-                <a:pos x="2311" y="361"/>
-              </a:cxn>
-              <a:cxn ang="0">
-                <a:pos x="2194" y="305"/>
-              </a:cxn>
-              <a:cxn ang="0">
-                <a:pos x="2075" y="253"/>
-              </a:cxn>
-              <a:cxn ang="0">
-                <a:pos x="1953" y="207"/>
-              </a:cxn>
-              <a:cxn ang="0">
-                <a:pos x="1830" y="164"/>
-              </a:cxn>
-              <a:cxn ang="0">
-                <a:pos x="1704" y="126"/>
-              </a:cxn>
-              <a:cxn ang="0">
-                <a:pos x="1577" y="93"/>
-              </a:cxn>
-              <a:cxn ang="0">
-                <a:pos x="1449" y="65"/>
-              </a:cxn>
-              <a:cxn ang="0">
-                <a:pos x="1319" y="41"/>
-              </a:cxn>
-              <a:cxn ang="0">
-                <a:pos x="1187" y="24"/>
-              </a:cxn>
-              <a:cxn ang="0">
-                <a:pos x="1055" y="10"/>
-              </a:cxn>
-              <a:cxn ang="0">
-                <a:pos x="921" y="2"/>
-              </a:cxn>
-              <a:cxn ang="0">
-                <a:pos x="786" y="0"/>
-              </a:cxn>
-              <a:cxn ang="0">
-                <a:pos x="0" y="0"/>
-              </a:cxn>
-              <a:cxn ang="0">
-                <a:pos x="0" y="7847"/>
-              </a:cxn>
-              <a:cxn ang="0">
-                <a:pos x="5879" y="7847"/>
-              </a:cxn>
-            </a:cxnLst>
-            <a:rect l="0" t="0" r="r" b="b"/>
-            <a:pathLst>
-              <a:path w="5879" h="7847">
-                <a:moveTo>
-                  <a:pt x="5879" y="7847"/>
-                </a:moveTo>
-                <a:lnTo>
-                  <a:pt x="5867" y="7764"/>
-                </a:lnTo>
-                <a:lnTo>
-                  <a:pt x="5851" y="7682"/>
-                </a:lnTo>
-                <a:lnTo>
-                  <a:pt x="5835" y="7599"/>
-                </a:lnTo>
-                <a:lnTo>
-                  <a:pt x="5816" y="7517"/>
-                </a:lnTo>
-                <a:lnTo>
-                  <a:pt x="5796" y="7437"/>
-                </a:lnTo>
-                <a:lnTo>
-                  <a:pt x="5773" y="7356"/>
-                </a:lnTo>
-                <a:lnTo>
-                  <a:pt x="5748" y="7275"/>
-                </a:lnTo>
-                <a:lnTo>
-                  <a:pt x="5721" y="7195"/>
-                </a:lnTo>
-                <a:lnTo>
-                  <a:pt x="3999" y="2278"/>
-                </a:lnTo>
-                <a:lnTo>
-                  <a:pt x="3952" y="2152"/>
-                </a:lnTo>
-                <a:lnTo>
-                  <a:pt x="3900" y="2028"/>
-                </a:lnTo>
-                <a:lnTo>
-                  <a:pt x="3843" y="1907"/>
-                </a:lnTo>
-                <a:lnTo>
-                  <a:pt x="3783" y="1789"/>
-                </a:lnTo>
-                <a:lnTo>
-                  <a:pt x="3718" y="1674"/>
-                </a:lnTo>
-                <a:lnTo>
-                  <a:pt x="3649" y="1562"/>
-                </a:lnTo>
-                <a:lnTo>
-                  <a:pt x="3576" y="1453"/>
-                </a:lnTo>
-                <a:lnTo>
-                  <a:pt x="3499" y="1347"/>
-                </a:lnTo>
-                <a:lnTo>
-                  <a:pt x="3418" y="1245"/>
-                </a:lnTo>
-                <a:lnTo>
-                  <a:pt x="3333" y="1146"/>
-                </a:lnTo>
-                <a:lnTo>
-                  <a:pt x="3245" y="1050"/>
-                </a:lnTo>
-                <a:lnTo>
-                  <a:pt x="3152" y="958"/>
-                </a:lnTo>
-                <a:lnTo>
-                  <a:pt x="3058" y="870"/>
-                </a:lnTo>
-                <a:lnTo>
-                  <a:pt x="2960" y="785"/>
-                </a:lnTo>
-                <a:lnTo>
-                  <a:pt x="2858" y="704"/>
-                </a:lnTo>
-                <a:lnTo>
-                  <a:pt x="2755" y="629"/>
-                </a:lnTo>
-                <a:lnTo>
-                  <a:pt x="2647" y="555"/>
-                </a:lnTo>
-                <a:lnTo>
-                  <a:pt x="2537" y="486"/>
-                </a:lnTo>
-                <a:lnTo>
-                  <a:pt x="2426" y="421"/>
-                </a:lnTo>
-                <a:lnTo>
-                  <a:pt x="2311" y="361"/>
-                </a:lnTo>
-                <a:lnTo>
-                  <a:pt x="2194" y="305"/>
-                </a:lnTo>
-                <a:lnTo>
-                  <a:pt x="2075" y="253"/>
-                </a:lnTo>
-                <a:lnTo>
-                  <a:pt x="1953" y="207"/>
-                </a:lnTo>
-                <a:lnTo>
-                  <a:pt x="1830" y="164"/>
-                </a:lnTo>
-                <a:lnTo>
-                  <a:pt x="1704" y="126"/>
-                </a:lnTo>
-                <a:lnTo>
-                  <a:pt x="1577" y="93"/>
-                </a:lnTo>
-                <a:lnTo>
-                  <a:pt x="1449" y="65"/>
-                </a:lnTo>
-                <a:lnTo>
-                  <a:pt x="1319" y="41"/>
-                </a:lnTo>
-                <a:lnTo>
-                  <a:pt x="1187" y="24"/>
-                </a:lnTo>
-                <a:lnTo>
-                  <a:pt x="1055" y="10"/>
-                </a:lnTo>
-                <a:lnTo>
-                  <a:pt x="921" y="2"/>
-                </a:lnTo>
-                <a:lnTo>
-                  <a:pt x="786" y="0"/>
-                </a:lnTo>
-                <a:lnTo>
-                  <a:pt x="0" y="0"/>
-                </a:lnTo>
-                <a:lnTo>
-                  <a:pt x="0" y="7847"/>
-                </a:lnTo>
-                <a:lnTo>
-                  <a:pt x="5879" y="7847"/>
-                </a:lnTo>
-                <a:close/>
-              </a:path>
-            </a:pathLst>
-          </a:custGeom>
-          <a:solidFill>
-            <a:srgbClr val="253746"/>
-          </a:solidFill>
-          <a:ln w="9525">
-            <a:noFill/>
-            <a:round/>
-            <a:headEnd/>
-            <a:tailEnd/>
-          </a:ln>
-        </p:spPr>
-        <p:txBody>
-          <a:bodyPr vert="horz" wrap="square" lIns="91440" tIns="45720" rIns="91440" bIns="45720" numCol="1" anchor="t" anchorCtr="0" compatLnSpc="1">
-            <a:prstTxWarp prst="textNoShape">
-              <a:avLst/>
-            </a:prstTxWarp>
-          </a:bodyPr>
-          <a:lstStyle/>
-          <a:p>
-            <a:endParaRPr lang="pt-BR" sz="2100"/>
-          </a:p>
-        </p:txBody>
-      </p:sp>
-      <p:sp>
-        <p:nvSpPr>
-          <p:cNvPr id="1033" name="Freeform 9"/>
-          <p:cNvSpPr>
-            <a:spLocks/>
-          </p:cNvSpPr>
-          <p:nvPr userDrawn="1"/>
-        </p:nvSpPr>
-        <p:spPr bwMode="auto">
-          <a:xfrm>
-            <a:off x="3031450" y="3630614"/>
-            <a:ext cx="1105611" cy="2500313"/>
-          </a:xfrm>
-          <a:custGeom>
-            <a:avLst/>
-            <a:gdLst/>
-            <a:ahLst/>
-            <a:cxnLst>
-              <a:cxn ang="0">
-                <a:pos x="1663" y="4706"/>
-              </a:cxn>
-              <a:cxn ang="0">
-                <a:pos x="59" y="0"/>
-              </a:cxn>
-              <a:cxn ang="0">
-                <a:pos x="0" y="18"/>
-              </a:cxn>
-              <a:cxn ang="0">
-                <a:pos x="1604" y="4724"/>
-              </a:cxn>
-              <a:cxn ang="0">
-                <a:pos x="1663" y="4706"/>
-              </a:cxn>
-            </a:cxnLst>
-            <a:rect l="0" t="0" r="r" b="b"/>
-            <a:pathLst>
-              <a:path w="1663" h="4724">
-                <a:moveTo>
-                  <a:pt x="1663" y="4706"/>
-                </a:moveTo>
-                <a:lnTo>
-                  <a:pt x="59" y="0"/>
-                </a:lnTo>
-                <a:lnTo>
-                  <a:pt x="0" y="18"/>
-                </a:lnTo>
-                <a:lnTo>
-                  <a:pt x="1604" y="4724"/>
-                </a:lnTo>
-                <a:lnTo>
-                  <a:pt x="1663" y="4706"/>
-                </a:lnTo>
-                <a:close/>
-              </a:path>
-            </a:pathLst>
-          </a:custGeom>
-          <a:solidFill>
-            <a:srgbClr val="32B9CD"/>
-          </a:solidFill>
-          <a:ln w="9525">
-            <a:noFill/>
-            <a:round/>
-            <a:headEnd/>
-            <a:tailEnd/>
-          </a:ln>
-        </p:spPr>
-        <p:txBody>
-          <a:bodyPr vert="horz" wrap="square" lIns="91440" tIns="45720" rIns="91440" bIns="45720" numCol="1" anchor="t" anchorCtr="0" compatLnSpc="1">
-            <a:prstTxWarp prst="textNoShape">
-              <a:avLst/>
-            </a:prstTxWarp>
-          </a:bodyPr>
-          <a:lstStyle/>
-          <a:p>
-            <a:endParaRPr lang="pt-BR" sz="2100"/>
-          </a:p>
-        </p:txBody>
-      </p:sp>
-      <p:sp>
-        <p:nvSpPr>
-          <p:cNvPr id="1034" name="Freeform 10"/>
-          <p:cNvSpPr>
-            <a:spLocks/>
-          </p:cNvSpPr>
-          <p:nvPr userDrawn="1"/>
-        </p:nvSpPr>
-        <p:spPr bwMode="auto">
-          <a:xfrm>
-            <a:off x="8856861" y="1057276"/>
-            <a:ext cx="1101619" cy="2487613"/>
-          </a:xfrm>
-          <a:custGeom>
-            <a:avLst/>
-            <a:gdLst/>
-            <a:ahLst/>
-            <a:cxnLst>
-              <a:cxn ang="0">
-                <a:pos x="1654" y="4683"/>
-              </a:cxn>
-              <a:cxn ang="0">
-                <a:pos x="59" y="0"/>
-              </a:cxn>
-              <a:cxn ang="0">
-                <a:pos x="0" y="18"/>
-              </a:cxn>
-              <a:cxn ang="0">
-                <a:pos x="1596" y="4700"/>
-              </a:cxn>
-              <a:cxn ang="0">
-                <a:pos x="1654" y="4683"/>
-              </a:cxn>
-            </a:cxnLst>
-            <a:rect l="0" t="0" r="r" b="b"/>
-            <a:pathLst>
-              <a:path w="1654" h="4700">
-                <a:moveTo>
-                  <a:pt x="1654" y="4683"/>
-                </a:moveTo>
-                <a:lnTo>
-                  <a:pt x="59" y="0"/>
-                </a:lnTo>
-                <a:lnTo>
-                  <a:pt x="0" y="18"/>
-                </a:lnTo>
-                <a:lnTo>
-                  <a:pt x="1596" y="4700"/>
-                </a:lnTo>
-                <a:lnTo>
-                  <a:pt x="1654" y="4683"/>
-                </a:lnTo>
-                <a:close/>
-              </a:path>
-            </a:pathLst>
-          </a:custGeom>
-          <a:solidFill>
-            <a:srgbClr val="32B9CD"/>
-          </a:solidFill>
-          <a:ln w="9525">
-            <a:noFill/>
-            <a:round/>
-            <a:headEnd/>
-            <a:tailEnd/>
-          </a:ln>
-        </p:spPr>
-        <p:txBody>
-          <a:bodyPr vert="horz" wrap="square" lIns="91440" tIns="45720" rIns="91440" bIns="45720" numCol="1" anchor="t" anchorCtr="0" compatLnSpc="1">
-            <a:prstTxWarp prst="textNoShape">
-              <a:avLst/>
-            </a:prstTxWarp>
-          </a:bodyPr>
-          <a:lstStyle/>
-          <a:p>
-            <a:endParaRPr lang="pt-BR" sz="2100"/>
-          </a:p>
-        </p:txBody>
-      </p:sp>
-    </p:spTree>
-  </p:cSld>
-  <p:clrMapOvr>
-    <a:masterClrMapping/>
-  </p:clrMapOvr>
-</p:sldLayout>
-</file>
-
-<file path=ppt/slideLayouts/slideLayout7.xml><?xml version="1.0" encoding="utf-8"?>
 <p:sldLayout xmlns:a="http://schemas.openxmlformats.org/drawingml/2006/main" xmlns:r="http://schemas.openxmlformats.org/officeDocument/2006/relationships" xmlns:p="http://schemas.openxmlformats.org/presentationml/2006/main" preserve="1" userDrawn="1">
   <p:cSld name="Capa com Título e Subtítulo B">
     <p:spTree>
@@ -20306,7 +17167,7 @@
 </p:sldLayout>
 </file>
 
-<file path=ppt/slideLayouts/slideLayout8.xml><?xml version="1.0" encoding="utf-8"?>
+<file path=ppt/slideLayouts/slideLayout7.xml><?xml version="1.0" encoding="utf-8"?>
 <p:sldLayout xmlns:a="http://schemas.openxmlformats.org/drawingml/2006/main" xmlns:r="http://schemas.openxmlformats.org/officeDocument/2006/relationships" xmlns:p="http://schemas.openxmlformats.org/presentationml/2006/main" preserve="1" userDrawn="1">
   <p:cSld name="Capa com IMAGEM B">
     <p:spTree>
@@ -21602,7 +18463,7 @@
 </p:sldLayout>
 </file>
 
-<file path=ppt/slideLayouts/slideLayout9.xml><?xml version="1.0" encoding="utf-8"?>
+<file path=ppt/slideLayouts/slideLayout8.xml><?xml version="1.0" encoding="utf-8"?>
 <p:sldLayout xmlns:a="http://schemas.openxmlformats.org/drawingml/2006/main" xmlns:r="http://schemas.openxmlformats.org/officeDocument/2006/relationships" xmlns:p="http://schemas.openxmlformats.org/presentationml/2006/main" userDrawn="1">
   <p:cSld name="Verde-titulo">
     <p:spTree>
@@ -21707,7 +18568,7 @@
                 </a:solidFill>
               </a:rPr>
               <a:pPr/>
-              <a:t>‹nº›</a:t>
+              <a:t>‹#›</a:t>
             </a:fld>
             <a:endParaRPr lang="pt-BR" dirty="0">
               <a:solidFill>
@@ -21774,6 +18635,1002 @@
 </p:sldLayout>
 </file>
 
+<file path=ppt/slideLayouts/slideLayout9.xml><?xml version="1.0" encoding="utf-8"?>
+<p:sldLayout xmlns:a="http://schemas.openxmlformats.org/drawingml/2006/main" xmlns:r="http://schemas.openxmlformats.org/officeDocument/2006/relationships" xmlns:p="http://schemas.openxmlformats.org/presentationml/2006/main" preserve="1">
+  <p:cSld name="Uma Parte de Conteúdo">
+    <p:spTree>
+      <p:nvGrpSpPr>
+        <p:cNvPr id="1" name=""/>
+        <p:cNvGrpSpPr/>
+        <p:nvPr/>
+      </p:nvGrpSpPr>
+      <p:grpSpPr>
+        <a:xfrm>
+          <a:off x="0" y="0"/>
+          <a:ext cx="0" cy="0"/>
+          <a:chOff x="0" y="0"/>
+          <a:chExt cx="0" cy="0"/>
+        </a:xfrm>
+      </p:grpSpPr>
+      <p:sp>
+        <p:nvSpPr>
+          <p:cNvPr id="4103" name="Freeform 7"/>
+          <p:cNvSpPr>
+            <a:spLocks/>
+          </p:cNvSpPr>
+          <p:nvPr/>
+        </p:nvSpPr>
+        <p:spPr bwMode="auto">
+          <a:xfrm>
+            <a:off x="12605478" y="6948983"/>
+            <a:ext cx="837472" cy="612280"/>
+          </a:xfrm>
+          <a:custGeom>
+            <a:avLst/>
+            <a:gdLst/>
+            <a:ahLst/>
+            <a:cxnLst>
+              <a:cxn ang="0">
+                <a:pos x="1475" y="0"/>
+              </a:cxn>
+              <a:cxn ang="0">
+                <a:pos x="742" y="258"/>
+              </a:cxn>
+              <a:cxn ang="0">
+                <a:pos x="701" y="273"/>
+              </a:cxn>
+              <a:cxn ang="0">
+                <a:pos x="660" y="290"/>
+              </a:cxn>
+              <a:cxn ang="0">
+                <a:pos x="620" y="309"/>
+              </a:cxn>
+              <a:cxn ang="0">
+                <a:pos x="582" y="329"/>
+              </a:cxn>
+              <a:cxn ang="0">
+                <a:pos x="544" y="350"/>
+              </a:cxn>
+              <a:cxn ang="0">
+                <a:pos x="508" y="373"/>
+              </a:cxn>
+              <a:cxn ang="0">
+                <a:pos x="472" y="397"/>
+              </a:cxn>
+              <a:cxn ang="0">
+                <a:pos x="437" y="422"/>
+              </a:cxn>
+              <a:cxn ang="0">
+                <a:pos x="404" y="449"/>
+              </a:cxn>
+              <a:cxn ang="0">
+                <a:pos x="371" y="477"/>
+              </a:cxn>
+              <a:cxn ang="0">
+                <a:pos x="341" y="506"/>
+              </a:cxn>
+              <a:cxn ang="0">
+                <a:pos x="311" y="536"/>
+              </a:cxn>
+              <a:cxn ang="0">
+                <a:pos x="281" y="566"/>
+              </a:cxn>
+              <a:cxn ang="0">
+                <a:pos x="254" y="599"/>
+              </a:cxn>
+              <a:cxn ang="0">
+                <a:pos x="228" y="632"/>
+              </a:cxn>
+              <a:cxn ang="0">
+                <a:pos x="203" y="666"/>
+              </a:cxn>
+              <a:cxn ang="0">
+                <a:pos x="179" y="701"/>
+              </a:cxn>
+              <a:cxn ang="0">
+                <a:pos x="158" y="738"/>
+              </a:cxn>
+              <a:cxn ang="0">
+                <a:pos x="136" y="775"/>
+              </a:cxn>
+              <a:cxn ang="0">
+                <a:pos x="117" y="813"/>
+              </a:cxn>
+              <a:cxn ang="0">
+                <a:pos x="98" y="850"/>
+              </a:cxn>
+              <a:cxn ang="0">
+                <a:pos x="82" y="890"/>
+              </a:cxn>
+              <a:cxn ang="0">
+                <a:pos x="67" y="930"/>
+              </a:cxn>
+              <a:cxn ang="0">
+                <a:pos x="53" y="970"/>
+              </a:cxn>
+              <a:cxn ang="0">
+                <a:pos x="41" y="1011"/>
+              </a:cxn>
+              <a:cxn ang="0">
+                <a:pos x="30" y="1053"/>
+              </a:cxn>
+              <a:cxn ang="0">
+                <a:pos x="21" y="1096"/>
+              </a:cxn>
+              <a:cxn ang="0">
+                <a:pos x="14" y="1138"/>
+              </a:cxn>
+              <a:cxn ang="0">
+                <a:pos x="7" y="1181"/>
+              </a:cxn>
+              <a:cxn ang="0">
+                <a:pos x="4" y="1224"/>
+              </a:cxn>
+              <a:cxn ang="0">
+                <a:pos x="1" y="1269"/>
+              </a:cxn>
+              <a:cxn ang="0">
+                <a:pos x="0" y="1313"/>
+              </a:cxn>
+              <a:cxn ang="0">
+                <a:pos x="0" y="1578"/>
+              </a:cxn>
+              <a:cxn ang="0">
+                <a:pos x="1475" y="1578"/>
+              </a:cxn>
+              <a:cxn ang="0">
+                <a:pos x="1475" y="0"/>
+              </a:cxn>
+            </a:cxnLst>
+            <a:rect l="0" t="0" r="r" b="b"/>
+            <a:pathLst>
+              <a:path w="1475" h="1578">
+                <a:moveTo>
+                  <a:pt x="1475" y="0"/>
+                </a:moveTo>
+                <a:lnTo>
+                  <a:pt x="742" y="258"/>
+                </a:lnTo>
+                <a:lnTo>
+                  <a:pt x="701" y="273"/>
+                </a:lnTo>
+                <a:lnTo>
+                  <a:pt x="660" y="290"/>
+                </a:lnTo>
+                <a:lnTo>
+                  <a:pt x="620" y="309"/>
+                </a:lnTo>
+                <a:lnTo>
+                  <a:pt x="582" y="329"/>
+                </a:lnTo>
+                <a:lnTo>
+                  <a:pt x="544" y="350"/>
+                </a:lnTo>
+                <a:lnTo>
+                  <a:pt x="508" y="373"/>
+                </a:lnTo>
+                <a:lnTo>
+                  <a:pt x="472" y="397"/>
+                </a:lnTo>
+                <a:lnTo>
+                  <a:pt x="437" y="422"/>
+                </a:lnTo>
+                <a:lnTo>
+                  <a:pt x="404" y="449"/>
+                </a:lnTo>
+                <a:lnTo>
+                  <a:pt x="371" y="477"/>
+                </a:lnTo>
+                <a:lnTo>
+                  <a:pt x="341" y="506"/>
+                </a:lnTo>
+                <a:lnTo>
+                  <a:pt x="311" y="536"/>
+                </a:lnTo>
+                <a:lnTo>
+                  <a:pt x="281" y="566"/>
+                </a:lnTo>
+                <a:lnTo>
+                  <a:pt x="254" y="599"/>
+                </a:lnTo>
+                <a:lnTo>
+                  <a:pt x="228" y="632"/>
+                </a:lnTo>
+                <a:lnTo>
+                  <a:pt x="203" y="666"/>
+                </a:lnTo>
+                <a:lnTo>
+                  <a:pt x="179" y="701"/>
+                </a:lnTo>
+                <a:lnTo>
+                  <a:pt x="158" y="738"/>
+                </a:lnTo>
+                <a:lnTo>
+                  <a:pt x="136" y="775"/>
+                </a:lnTo>
+                <a:lnTo>
+                  <a:pt x="117" y="813"/>
+                </a:lnTo>
+                <a:lnTo>
+                  <a:pt x="98" y="850"/>
+                </a:lnTo>
+                <a:lnTo>
+                  <a:pt x="82" y="890"/>
+                </a:lnTo>
+                <a:lnTo>
+                  <a:pt x="67" y="930"/>
+                </a:lnTo>
+                <a:lnTo>
+                  <a:pt x="53" y="970"/>
+                </a:lnTo>
+                <a:lnTo>
+                  <a:pt x="41" y="1011"/>
+                </a:lnTo>
+                <a:lnTo>
+                  <a:pt x="30" y="1053"/>
+                </a:lnTo>
+                <a:lnTo>
+                  <a:pt x="21" y="1096"/>
+                </a:lnTo>
+                <a:lnTo>
+                  <a:pt x="14" y="1138"/>
+                </a:lnTo>
+                <a:lnTo>
+                  <a:pt x="7" y="1181"/>
+                </a:lnTo>
+                <a:lnTo>
+                  <a:pt x="4" y="1224"/>
+                </a:lnTo>
+                <a:lnTo>
+                  <a:pt x="1" y="1269"/>
+                </a:lnTo>
+                <a:lnTo>
+                  <a:pt x="0" y="1313"/>
+                </a:lnTo>
+                <a:lnTo>
+                  <a:pt x="0" y="1578"/>
+                </a:lnTo>
+                <a:lnTo>
+                  <a:pt x="1475" y="1578"/>
+                </a:lnTo>
+                <a:lnTo>
+                  <a:pt x="1475" y="0"/>
+                </a:lnTo>
+                <a:close/>
+              </a:path>
+            </a:pathLst>
+          </a:custGeom>
+          <a:solidFill>
+            <a:srgbClr val="292C34"/>
+          </a:solidFill>
+          <a:ln w="9525">
+            <a:noFill/>
+            <a:round/>
+            <a:headEnd/>
+            <a:tailEnd/>
+          </a:ln>
+        </p:spPr>
+        <p:txBody>
+          <a:bodyPr vert="horz" wrap="square" lIns="91440" tIns="45720" rIns="91440" bIns="45720" numCol="1" anchor="t" anchorCtr="0" compatLnSpc="1">
+            <a:prstTxWarp prst="textNoShape">
+              <a:avLst/>
+            </a:prstTxWarp>
+          </a:bodyPr>
+          <a:lstStyle/>
+          <a:p>
+            <a:endParaRPr lang="pt-BR" sz="2100"/>
+          </a:p>
+        </p:txBody>
+      </p:sp>
+      <p:sp>
+        <p:nvSpPr>
+          <p:cNvPr id="18" name="Espaço Reservado para Texto 17"/>
+          <p:cNvSpPr>
+            <a:spLocks noGrp="1"/>
+          </p:cNvSpPr>
+          <p:nvPr>
+            <p:ph type="body" sz="quarter" idx="11"/>
+          </p:nvPr>
+        </p:nvSpPr>
+        <p:spPr>
+          <a:xfrm>
+            <a:off x="2828982" y="1331914"/>
+            <a:ext cx="8779933" cy="5761037"/>
+          </a:xfrm>
+          <a:prstGeom prst="rect">
+            <a:avLst/>
+          </a:prstGeom>
+        </p:spPr>
+        <p:txBody>
+          <a:bodyPr/>
+          <a:lstStyle>
+            <a:lvl1pPr>
+              <a:buClr>
+                <a:srgbClr val="32B9CD"/>
+              </a:buClr>
+              <a:defRPr>
+                <a:latin typeface="Exo 2" pitchFamily="50" charset="0"/>
+              </a:defRPr>
+            </a:lvl1pPr>
+            <a:lvl2pPr>
+              <a:buClr>
+                <a:srgbClr val="32B9CD"/>
+              </a:buClr>
+              <a:defRPr>
+                <a:latin typeface="Exo 2" pitchFamily="50" charset="0"/>
+              </a:defRPr>
+            </a:lvl2pPr>
+            <a:lvl3pPr>
+              <a:buClr>
+                <a:srgbClr val="32B9CD"/>
+              </a:buClr>
+              <a:defRPr>
+                <a:latin typeface="Exo 2" pitchFamily="50" charset="0"/>
+              </a:defRPr>
+            </a:lvl3pPr>
+            <a:lvl4pPr>
+              <a:buClr>
+                <a:srgbClr val="32B9CD"/>
+              </a:buClr>
+              <a:defRPr>
+                <a:latin typeface="Exo 2" pitchFamily="50" charset="0"/>
+              </a:defRPr>
+            </a:lvl4pPr>
+            <a:lvl5pPr>
+              <a:buClr>
+                <a:srgbClr val="32B9CD"/>
+              </a:buClr>
+              <a:defRPr>
+                <a:latin typeface="Exo 2" pitchFamily="50" charset="0"/>
+              </a:defRPr>
+            </a:lvl5pPr>
+          </a:lstStyle>
+          <a:p>
+            <a:pPr lvl="0"/>
+            <a:r>
+              <a:rPr lang="pt-BR"/>
+              <a:t>Clique para editar os estilos do texto mestre</a:t>
+            </a:r>
+          </a:p>
+          <a:p>
+            <a:pPr lvl="1"/>
+            <a:r>
+              <a:rPr lang="pt-BR"/>
+              <a:t>Segundo nível</a:t>
+            </a:r>
+          </a:p>
+          <a:p>
+            <a:pPr lvl="2"/>
+            <a:r>
+              <a:rPr lang="pt-BR"/>
+              <a:t>Terceiro nível</a:t>
+            </a:r>
+          </a:p>
+          <a:p>
+            <a:pPr lvl="3"/>
+            <a:r>
+              <a:rPr lang="pt-BR"/>
+              <a:t>Quarto nível</a:t>
+            </a:r>
+          </a:p>
+          <a:p>
+            <a:pPr lvl="4"/>
+            <a:r>
+              <a:rPr lang="pt-BR"/>
+              <a:t>Quinto nível</a:t>
+            </a:r>
+            <a:endParaRPr lang="pt-BR" dirty="0"/>
+          </a:p>
+        </p:txBody>
+      </p:sp>
+      <p:sp>
+        <p:nvSpPr>
+          <p:cNvPr id="7" name="Rectangle 4"/>
+          <p:cNvSpPr>
+            <a:spLocks noGrp="1" noChangeArrowheads="1"/>
+          </p:cNvSpPr>
+          <p:nvPr>
+            <p:ph type="sldNum" sz="quarter" idx="4"/>
+          </p:nvPr>
+        </p:nvSpPr>
+        <p:spPr bwMode="auto">
+          <a:xfrm>
+            <a:off x="12605478" y="7237015"/>
+            <a:ext cx="628646" cy="214290"/>
+          </a:xfrm>
+          <a:prstGeom prst="rect">
+            <a:avLst/>
+          </a:prstGeom>
+          <a:noFill/>
+          <a:ln w="9525">
+            <a:noFill/>
+            <a:miter lim="800000"/>
+            <a:headEnd/>
+            <a:tailEnd/>
+          </a:ln>
+          <a:effectLst/>
+        </p:spPr>
+        <p:txBody>
+          <a:bodyPr vert="horz" wrap="square" lIns="18000" tIns="10800" rIns="18000" bIns="10800" numCol="1" anchor="t" anchorCtr="0" compatLnSpc="1">
+            <a:prstTxWarp prst="textNoShape">
+              <a:avLst/>
+            </a:prstTxWarp>
+          </a:bodyPr>
+          <a:lstStyle>
+            <a:lvl1pPr algn="r">
+              <a:spcBef>
+                <a:spcPct val="0"/>
+              </a:spcBef>
+              <a:spcAft>
+                <a:spcPct val="0"/>
+              </a:spcAft>
+              <a:defRPr sz="1000" b="1">
+                <a:solidFill>
+                  <a:schemeClr val="bg1"/>
+                </a:solidFill>
+                <a:latin typeface="Exo 2" pitchFamily="50" charset="0"/>
+                <a:ea typeface="Tahoma" pitchFamily="34" charset="0"/>
+                <a:cs typeface="Tahoma" pitchFamily="34" charset="0"/>
+              </a:defRPr>
+            </a:lvl1pPr>
+          </a:lstStyle>
+          <a:p>
+            <a:pPr>
+              <a:defRPr/>
+            </a:pPr>
+            <a:fld id="{B66251D2-9488-44CD-87B4-F793A73C4A01}" type="slidenum">
+              <a:rPr lang="pt-BR" smtClean="0"/>
+              <a:pPr>
+                <a:defRPr/>
+              </a:pPr>
+              <a:t>‹#›</a:t>
+            </a:fld>
+            <a:endParaRPr lang="pt-BR" sz="700" dirty="0"/>
+          </a:p>
+        </p:txBody>
+      </p:sp>
+      <p:sp>
+        <p:nvSpPr>
+          <p:cNvPr id="9" name="Freeform 6"/>
+          <p:cNvSpPr>
+            <a:spLocks/>
+          </p:cNvSpPr>
+          <p:nvPr/>
+        </p:nvSpPr>
+        <p:spPr bwMode="auto">
+          <a:xfrm>
+            <a:off x="1" y="1"/>
+            <a:ext cx="2401423" cy="1332359"/>
+          </a:xfrm>
+          <a:custGeom>
+            <a:avLst/>
+            <a:gdLst/>
+            <a:ahLst/>
+            <a:cxnLst>
+              <a:cxn ang="0">
+                <a:pos x="3091" y="1686"/>
+              </a:cxn>
+              <a:cxn ang="0">
+                <a:pos x="3117" y="1687"/>
+              </a:cxn>
+              <a:cxn ang="0">
+                <a:pos x="3156" y="1689"/>
+              </a:cxn>
+              <a:cxn ang="0">
+                <a:pos x="3169" y="1687"/>
+              </a:cxn>
+              <a:cxn ang="0">
+                <a:pos x="3252" y="1655"/>
+              </a:cxn>
+              <a:cxn ang="0">
+                <a:pos x="3332" y="1617"/>
+              </a:cxn>
+              <a:cxn ang="0">
+                <a:pos x="3408" y="1573"/>
+              </a:cxn>
+              <a:cxn ang="0">
+                <a:pos x="3478" y="1523"/>
+              </a:cxn>
+              <a:cxn ang="0">
+                <a:pos x="3545" y="1469"/>
+              </a:cxn>
+              <a:cxn ang="0">
+                <a:pos x="3608" y="1411"/>
+              </a:cxn>
+              <a:cxn ang="0">
+                <a:pos x="3665" y="1346"/>
+              </a:cxn>
+              <a:cxn ang="0">
+                <a:pos x="3718" y="1279"/>
+              </a:cxn>
+              <a:cxn ang="0">
+                <a:pos x="3765" y="1207"/>
+              </a:cxn>
+              <a:cxn ang="0">
+                <a:pos x="3807" y="1133"/>
+              </a:cxn>
+              <a:cxn ang="0">
+                <a:pos x="3842" y="1055"/>
+              </a:cxn>
+              <a:cxn ang="0">
+                <a:pos x="3872" y="974"/>
+              </a:cxn>
+              <a:cxn ang="0">
+                <a:pos x="3896" y="890"/>
+              </a:cxn>
+              <a:cxn ang="0">
+                <a:pos x="3913" y="805"/>
+              </a:cxn>
+              <a:cxn ang="0">
+                <a:pos x="3923" y="717"/>
+              </a:cxn>
+              <a:cxn ang="0">
+                <a:pos x="3927" y="628"/>
+              </a:cxn>
+              <a:cxn ang="0">
+                <a:pos x="3855" y="0"/>
+              </a:cxn>
+              <a:cxn ang="0">
+                <a:pos x="3088" y="0"/>
+              </a:cxn>
+              <a:cxn ang="0">
+                <a:pos x="3855" y="278"/>
+              </a:cxn>
+              <a:cxn ang="0">
+                <a:pos x="3853" y="671"/>
+              </a:cxn>
+              <a:cxn ang="0">
+                <a:pos x="3847" y="753"/>
+              </a:cxn>
+              <a:cxn ang="0">
+                <a:pos x="3834" y="834"/>
+              </a:cxn>
+              <a:cxn ang="0">
+                <a:pos x="3814" y="913"/>
+              </a:cxn>
+              <a:cxn ang="0">
+                <a:pos x="3790" y="990"/>
+              </a:cxn>
+              <a:cxn ang="0">
+                <a:pos x="3759" y="1063"/>
+              </a:cxn>
+              <a:cxn ang="0">
+                <a:pos x="3723" y="1135"/>
+              </a:cxn>
+              <a:cxn ang="0">
+                <a:pos x="3682" y="1204"/>
+              </a:cxn>
+              <a:cxn ang="0">
+                <a:pos x="3635" y="1269"/>
+              </a:cxn>
+              <a:cxn ang="0">
+                <a:pos x="3583" y="1330"/>
+              </a:cxn>
+              <a:cxn ang="0">
+                <a:pos x="3528" y="1388"/>
+              </a:cxn>
+              <a:cxn ang="0">
+                <a:pos x="3467" y="1441"/>
+              </a:cxn>
+              <a:cxn ang="0">
+                <a:pos x="3403" y="1489"/>
+              </a:cxn>
+              <a:cxn ang="0">
+                <a:pos x="3333" y="1533"/>
+              </a:cxn>
+              <a:cxn ang="0">
+                <a:pos x="3261" y="1571"/>
+              </a:cxn>
+              <a:cxn ang="0">
+                <a:pos x="3185" y="1604"/>
+              </a:cxn>
+              <a:cxn ang="0">
+                <a:pos x="3140" y="1621"/>
+              </a:cxn>
+              <a:cxn ang="0">
+                <a:pos x="3121" y="1636"/>
+              </a:cxn>
+              <a:cxn ang="0">
+                <a:pos x="3091" y="1661"/>
+              </a:cxn>
+              <a:cxn ang="0">
+                <a:pos x="0" y="2718"/>
+              </a:cxn>
+            </a:cxnLst>
+            <a:rect l="0" t="0" r="r" b="b"/>
+            <a:pathLst>
+              <a:path w="3927" h="2740">
+                <a:moveTo>
+                  <a:pt x="0" y="2740"/>
+                </a:moveTo>
+                <a:lnTo>
+                  <a:pt x="3091" y="1686"/>
+                </a:lnTo>
+                <a:lnTo>
+                  <a:pt x="3098" y="1686"/>
+                </a:lnTo>
+                <a:lnTo>
+                  <a:pt x="3117" y="1687"/>
+                </a:lnTo>
+                <a:lnTo>
+                  <a:pt x="3139" y="1689"/>
+                </a:lnTo>
+                <a:lnTo>
+                  <a:pt x="3156" y="1689"/>
+                </a:lnTo>
+                <a:lnTo>
+                  <a:pt x="3163" y="1689"/>
+                </a:lnTo>
+                <a:lnTo>
+                  <a:pt x="3169" y="1687"/>
+                </a:lnTo>
+                <a:lnTo>
+                  <a:pt x="3211" y="1672"/>
+                </a:lnTo>
+                <a:lnTo>
+                  <a:pt x="3252" y="1655"/>
+                </a:lnTo>
+                <a:lnTo>
+                  <a:pt x="3293" y="1637"/>
+                </a:lnTo>
+                <a:lnTo>
+                  <a:pt x="3332" y="1617"/>
+                </a:lnTo>
+                <a:lnTo>
+                  <a:pt x="3370" y="1595"/>
+                </a:lnTo>
+                <a:lnTo>
+                  <a:pt x="3408" y="1573"/>
+                </a:lnTo>
+                <a:lnTo>
+                  <a:pt x="3443" y="1549"/>
+                </a:lnTo>
+                <a:lnTo>
+                  <a:pt x="3478" y="1523"/>
+                </a:lnTo>
+                <a:lnTo>
+                  <a:pt x="3512" y="1497"/>
+                </a:lnTo>
+                <a:lnTo>
+                  <a:pt x="3545" y="1469"/>
+                </a:lnTo>
+                <a:lnTo>
+                  <a:pt x="3577" y="1440"/>
+                </a:lnTo>
+                <a:lnTo>
+                  <a:pt x="3608" y="1411"/>
+                </a:lnTo>
+                <a:lnTo>
+                  <a:pt x="3637" y="1379"/>
+                </a:lnTo>
+                <a:lnTo>
+                  <a:pt x="3665" y="1346"/>
+                </a:lnTo>
+                <a:lnTo>
+                  <a:pt x="3692" y="1314"/>
+                </a:lnTo>
+                <a:lnTo>
+                  <a:pt x="3718" y="1279"/>
+                </a:lnTo>
+                <a:lnTo>
+                  <a:pt x="3742" y="1244"/>
+                </a:lnTo>
+                <a:lnTo>
+                  <a:pt x="3765" y="1207"/>
+                </a:lnTo>
+                <a:lnTo>
+                  <a:pt x="3786" y="1171"/>
+                </a:lnTo>
+                <a:lnTo>
+                  <a:pt x="3807" y="1133"/>
+                </a:lnTo>
+                <a:lnTo>
+                  <a:pt x="3826" y="1094"/>
+                </a:lnTo>
+                <a:lnTo>
+                  <a:pt x="3842" y="1055"/>
+                </a:lnTo>
+                <a:lnTo>
+                  <a:pt x="3858" y="1014"/>
+                </a:lnTo>
+                <a:lnTo>
+                  <a:pt x="3872" y="974"/>
+                </a:lnTo>
+                <a:lnTo>
+                  <a:pt x="3885" y="932"/>
+                </a:lnTo>
+                <a:lnTo>
+                  <a:pt x="3896" y="890"/>
+                </a:lnTo>
+                <a:lnTo>
+                  <a:pt x="3905" y="848"/>
+                </a:lnTo>
+                <a:lnTo>
+                  <a:pt x="3913" y="805"/>
+                </a:lnTo>
+                <a:lnTo>
+                  <a:pt x="3919" y="762"/>
+                </a:lnTo>
+                <a:lnTo>
+                  <a:pt x="3923" y="717"/>
+                </a:lnTo>
+                <a:lnTo>
+                  <a:pt x="3927" y="673"/>
+                </a:lnTo>
+                <a:lnTo>
+                  <a:pt x="3927" y="628"/>
+                </a:lnTo>
+                <a:lnTo>
+                  <a:pt x="3927" y="0"/>
+                </a:lnTo>
+                <a:lnTo>
+                  <a:pt x="3855" y="0"/>
+                </a:lnTo>
+                <a:lnTo>
+                  <a:pt x="3855" y="256"/>
+                </a:lnTo>
+                <a:lnTo>
+                  <a:pt x="3088" y="0"/>
+                </a:lnTo>
+                <a:lnTo>
+                  <a:pt x="3022" y="0"/>
+                </a:lnTo>
+                <a:lnTo>
+                  <a:pt x="3855" y="278"/>
+                </a:lnTo>
+                <a:lnTo>
+                  <a:pt x="3855" y="628"/>
+                </a:lnTo>
+                <a:lnTo>
+                  <a:pt x="3853" y="671"/>
+                </a:lnTo>
+                <a:lnTo>
+                  <a:pt x="3851" y="711"/>
+                </a:lnTo>
+                <a:lnTo>
+                  <a:pt x="3847" y="753"/>
+                </a:lnTo>
+                <a:lnTo>
+                  <a:pt x="3841" y="793"/>
+                </a:lnTo>
+                <a:lnTo>
+                  <a:pt x="3834" y="834"/>
+                </a:lnTo>
+                <a:lnTo>
+                  <a:pt x="3826" y="874"/>
+                </a:lnTo>
+                <a:lnTo>
+                  <a:pt x="3814" y="913"/>
+                </a:lnTo>
+                <a:lnTo>
+                  <a:pt x="3803" y="951"/>
+                </a:lnTo>
+                <a:lnTo>
+                  <a:pt x="3790" y="990"/>
+                </a:lnTo>
+                <a:lnTo>
+                  <a:pt x="3775" y="1027"/>
+                </a:lnTo>
+                <a:lnTo>
+                  <a:pt x="3759" y="1063"/>
+                </a:lnTo>
+                <a:lnTo>
+                  <a:pt x="3742" y="1100"/>
+                </a:lnTo>
+                <a:lnTo>
+                  <a:pt x="3723" y="1135"/>
+                </a:lnTo>
+                <a:lnTo>
+                  <a:pt x="3703" y="1170"/>
+                </a:lnTo>
+                <a:lnTo>
+                  <a:pt x="3682" y="1204"/>
+                </a:lnTo>
+                <a:lnTo>
+                  <a:pt x="3659" y="1237"/>
+                </a:lnTo>
+                <a:lnTo>
+                  <a:pt x="3635" y="1269"/>
+                </a:lnTo>
+                <a:lnTo>
+                  <a:pt x="3610" y="1300"/>
+                </a:lnTo>
+                <a:lnTo>
+                  <a:pt x="3583" y="1330"/>
+                </a:lnTo>
+                <a:lnTo>
+                  <a:pt x="3555" y="1359"/>
+                </a:lnTo>
+                <a:lnTo>
+                  <a:pt x="3528" y="1388"/>
+                </a:lnTo>
+                <a:lnTo>
+                  <a:pt x="3497" y="1415"/>
+                </a:lnTo>
+                <a:lnTo>
+                  <a:pt x="3467" y="1441"/>
+                </a:lnTo>
+                <a:lnTo>
+                  <a:pt x="3435" y="1465"/>
+                </a:lnTo>
+                <a:lnTo>
+                  <a:pt x="3403" y="1489"/>
+                </a:lnTo>
+                <a:lnTo>
+                  <a:pt x="3368" y="1512"/>
+                </a:lnTo>
+                <a:lnTo>
+                  <a:pt x="3333" y="1533"/>
+                </a:lnTo>
+                <a:lnTo>
+                  <a:pt x="3298" y="1552"/>
+                </a:lnTo>
+                <a:lnTo>
+                  <a:pt x="3261" y="1571"/>
+                </a:lnTo>
+                <a:lnTo>
+                  <a:pt x="3223" y="1588"/>
+                </a:lnTo>
+                <a:lnTo>
+                  <a:pt x="3185" y="1604"/>
+                </a:lnTo>
+                <a:lnTo>
+                  <a:pt x="3145" y="1618"/>
+                </a:lnTo>
+                <a:lnTo>
+                  <a:pt x="3140" y="1621"/>
+                </a:lnTo>
+                <a:lnTo>
+                  <a:pt x="3135" y="1624"/>
+                </a:lnTo>
+                <a:lnTo>
+                  <a:pt x="3121" y="1636"/>
+                </a:lnTo>
+                <a:lnTo>
+                  <a:pt x="3104" y="1650"/>
+                </a:lnTo>
+                <a:lnTo>
+                  <a:pt x="3091" y="1661"/>
+                </a:lnTo>
+                <a:lnTo>
+                  <a:pt x="3084" y="1666"/>
+                </a:lnTo>
+                <a:lnTo>
+                  <a:pt x="0" y="2718"/>
+                </a:lnTo>
+                <a:lnTo>
+                  <a:pt x="0" y="2740"/>
+                </a:lnTo>
+                <a:close/>
+              </a:path>
+            </a:pathLst>
+          </a:custGeom>
+          <a:solidFill>
+            <a:srgbClr val="3B3D42"/>
+          </a:solidFill>
+          <a:ln w="9525">
+            <a:noFill/>
+            <a:round/>
+            <a:headEnd/>
+            <a:tailEnd/>
+          </a:ln>
+        </p:spPr>
+        <p:txBody>
+          <a:bodyPr vert="horz" wrap="square" lIns="91440" tIns="45720" rIns="91440" bIns="45720" numCol="1" anchor="t" anchorCtr="0" compatLnSpc="1">
+            <a:prstTxWarp prst="textNoShape">
+              <a:avLst/>
+            </a:prstTxWarp>
+          </a:bodyPr>
+          <a:lstStyle/>
+          <a:p>
+            <a:endParaRPr lang="pt-BR" sz="2100"/>
+          </a:p>
+        </p:txBody>
+      </p:sp>
+      <p:sp>
+        <p:nvSpPr>
+          <p:cNvPr id="10" name="Espaço Reservado para Texto 15"/>
+          <p:cNvSpPr>
+            <a:spLocks noGrp="1"/>
+          </p:cNvSpPr>
+          <p:nvPr>
+            <p:ph type="body" sz="quarter" idx="13" hasCustomPrompt="1"/>
+          </p:nvPr>
+        </p:nvSpPr>
+        <p:spPr>
+          <a:xfrm>
+            <a:off x="2829885" y="108224"/>
+            <a:ext cx="10137686" cy="765639"/>
+          </a:xfrm>
+          <a:prstGeom prst="rect">
+            <a:avLst/>
+          </a:prstGeom>
+        </p:spPr>
+        <p:txBody>
+          <a:bodyPr anchor="t"/>
+          <a:lstStyle>
+            <a:lvl1pPr>
+              <a:buNone/>
+              <a:defRPr sz="3000" b="1" baseline="0">
+                <a:solidFill>
+                  <a:srgbClr val="32B9CD"/>
+                </a:solidFill>
+                <a:latin typeface="Exo 2" pitchFamily="50" charset="0"/>
+              </a:defRPr>
+            </a:lvl1pPr>
+            <a:lvl2pPr>
+              <a:buNone/>
+              <a:defRPr sz="3000">
+                <a:latin typeface="Exo 2" pitchFamily="50" charset="0"/>
+              </a:defRPr>
+            </a:lvl2pPr>
+            <a:lvl3pPr>
+              <a:buNone/>
+              <a:defRPr sz="3000">
+                <a:latin typeface="Exo 2" pitchFamily="50" charset="0"/>
+              </a:defRPr>
+            </a:lvl3pPr>
+            <a:lvl4pPr>
+              <a:buNone/>
+              <a:defRPr sz="3000">
+                <a:latin typeface="Exo 2" pitchFamily="50" charset="0"/>
+              </a:defRPr>
+            </a:lvl4pPr>
+            <a:lvl5pPr>
+              <a:buNone/>
+              <a:defRPr sz="3000">
+                <a:latin typeface="Exo 2" pitchFamily="50" charset="0"/>
+              </a:defRPr>
+            </a:lvl5pPr>
+          </a:lstStyle>
+          <a:p>
+            <a:pPr lvl="0"/>
+            <a:r>
+              <a:rPr lang="pt-BR" dirty="0"/>
+              <a:t>Clique para editar título do slide</a:t>
+            </a:r>
+          </a:p>
+        </p:txBody>
+      </p:sp>
+      <p:pic>
+        <p:nvPicPr>
+          <p:cNvPr id="11" name="Imagem 10"/>
+          <p:cNvPicPr>
+            <a:picLocks noChangeAspect="1"/>
+          </p:cNvPicPr>
+          <p:nvPr userDrawn="1"/>
+        </p:nvPicPr>
+        <p:blipFill>
+          <a:blip r:embed="rId2" cstate="print">
+            <a:extLst>
+              <a:ext uri="{28A0092B-C50C-407E-A947-70E740481C1C}">
+                <a14:useLocalDpi xmlns:a14="http://schemas.microsoft.com/office/drawing/2010/main" val="0"/>
+              </a:ext>
+            </a:extLst>
+          </a:blip>
+          <a:stretch>
+            <a:fillRect/>
+          </a:stretch>
+        </p:blipFill>
+        <p:spPr>
+          <a:xfrm>
+            <a:off x="212219" y="166075"/>
+            <a:ext cx="1687192" cy="500104"/>
+          </a:xfrm>
+          <a:prstGeom prst="rect">
+            <a:avLst/>
+          </a:prstGeom>
+        </p:spPr>
+      </p:pic>
+    </p:spTree>
+  </p:cSld>
+  <p:clrMapOvr>
+    <a:masterClrMapping/>
+  </p:clrMapOvr>
+  <p:hf hdr="0" ftr="0" dt="0"/>
+</p:sldLayout>
+</file>
+
 <file path=ppt/slideMasters/slideMaster1.xml><?xml version="1.0" encoding="utf-8"?>
 <p:sldMaster xmlns:a="http://schemas.openxmlformats.org/drawingml/2006/main" xmlns:r="http://schemas.openxmlformats.org/officeDocument/2006/relationships" xmlns:p="http://schemas.openxmlformats.org/presentationml/2006/main">
   <p:cSld>
@@ -21804,11 +19661,10 @@
     <p:sldLayoutId id="2147483655" r:id="rId2"/>
     <p:sldLayoutId id="2147483658" r:id="rId3"/>
     <p:sldLayoutId id="2147483659" r:id="rId4"/>
-    <p:sldLayoutId id="2147483663" r:id="rId5"/>
-    <p:sldLayoutId id="2147483664" r:id="rId6"/>
-    <p:sldLayoutId id="2147483651" r:id="rId7"/>
-    <p:sldLayoutId id="2147483650" r:id="rId8"/>
-    <p:sldLayoutId id="2147483667" r:id="rId9"/>
+    <p:sldLayoutId id="2147483664" r:id="rId5"/>
+    <p:sldLayoutId id="2147483651" r:id="rId6"/>
+    <p:sldLayoutId id="2147483650" r:id="rId7"/>
+    <p:sldLayoutId id="2147483667" r:id="rId8"/>
   </p:sldLayoutIdLst>
   <p:hf hdr="0" ftr="0" dt="0"/>
   <p:txStyles>
@@ -22631,36 +20487,6 @@
 <file path=ppt/slides/slide1.xml><?xml version="1.0" encoding="utf-8"?>
 <p:sld xmlns:a="http://schemas.openxmlformats.org/drawingml/2006/main" xmlns:r="http://schemas.openxmlformats.org/officeDocument/2006/relationships" xmlns:p="http://schemas.openxmlformats.org/presentationml/2006/main">
   <p:cSld>
-    <p:bg>
-      <p:bgRef idx="1001">
-        <a:schemeClr val="bg1"/>
-      </p:bgRef>
-    </p:bg>
-    <p:spTree>
-      <p:nvGrpSpPr>
-        <p:cNvPr id="1" name=""/>
-        <p:cNvGrpSpPr/>
-        <p:nvPr/>
-      </p:nvGrpSpPr>
-      <p:grpSpPr>
-        <a:xfrm>
-          <a:off x="0" y="0"/>
-          <a:ext cx="0" cy="0"/>
-          <a:chOff x="0" y="0"/>
-          <a:chExt cx="0" cy="0"/>
-        </a:xfrm>
-      </p:grpSpPr>
-    </p:spTree>
-  </p:cSld>
-  <p:clrMapOvr>
-    <a:overrideClrMapping bg1="lt1" tx1="dk1" bg2="lt2" tx2="dk2" accent1="accent1" accent2="accent2" accent3="accent3" accent4="accent4" accent5="accent5" accent6="accent6" hlink="hlink" folHlink="folHlink"/>
-  </p:clrMapOvr>
-</p:sld>
-</file>
-
-<file path=ppt/slides/slide2.xml><?xml version="1.0" encoding="utf-8"?>
-<p:sld xmlns:a="http://schemas.openxmlformats.org/drawingml/2006/main" xmlns:r="http://schemas.openxmlformats.org/officeDocument/2006/relationships" xmlns:p="http://schemas.openxmlformats.org/presentationml/2006/main">
-  <p:cSld>
     <p:spTree>
       <p:nvGrpSpPr>
         <p:cNvPr id="1" name=""/>
@@ -22677,10 +20503,10 @@
       </p:grpSpPr>
       <p:sp>
         <p:nvSpPr>
-          <p:cNvPr id="2" name="Espaço Reservado para Texto 1">
+          <p:cNvPr id="3" name="Slide Number Placeholder 2">
             <a:extLst>
               <a:ext uri="{FF2B5EF4-FFF2-40B4-BE49-F238E27FC236}">
-                <a16:creationId xmlns:a16="http://schemas.microsoft.com/office/drawing/2014/main" id="{E8B0A577-E3E3-4D35-AA82-89ED5D5451DD}"/>
+                <a16:creationId xmlns:a16="http://schemas.microsoft.com/office/drawing/2014/main" id="{6C2C6202-BFCA-4D07-B278-64C8628EFB01}"/>
               </a:ext>
             </a:extLst>
           </p:cNvPr>
@@ -22688,7 +20514,7 @@
             <a:spLocks noGrp="1"/>
           </p:cNvSpPr>
           <p:nvPr>
-            <p:ph type="body" sz="quarter" idx="11"/>
+            <p:ph type="sldNum" sz="quarter" idx="4"/>
           </p:nvPr>
         </p:nvSpPr>
         <p:spPr/>
@@ -22696,80 +20522,67 @@
           <a:bodyPr/>
           <a:lstStyle/>
           <a:p>
-            <a:r>
-              <a:rPr lang="pt-BR" dirty="0"/>
-              <a:t>Reunião Semanal </a:t>
-            </a:r>
+            <a:fld id="{74850952-3374-434C-8FC6-DE28F8CD25B0}" type="slidenum">
+              <a:rPr lang="pt-BR" smtClean="0">
+                <a:solidFill>
+                  <a:prstClr val="black">
+                    <a:tint val="75000"/>
+                  </a:prstClr>
+                </a:solidFill>
+              </a:rPr>
+              <a:pPr/>
+              <a:t>1</a:t>
+            </a:fld>
+            <a:endParaRPr lang="pt-BR" dirty="0">
+              <a:solidFill>
+                <a:prstClr val="black">
+                  <a:tint val="75000"/>
+                </a:prstClr>
+              </a:solidFill>
+            </a:endParaRPr>
           </a:p>
         </p:txBody>
       </p:sp>
-      <p:sp>
-        <p:nvSpPr>
-          <p:cNvPr id="4" name="Espaço Reservado para Texto 3">
+      <p:pic>
+        <p:nvPicPr>
+          <p:cNvPr id="5" name="Picture 4" descr="A picture containing text, building&#10;&#10;Description automatically generated">
             <a:extLst>
               <a:ext uri="{FF2B5EF4-FFF2-40B4-BE49-F238E27FC236}">
-                <a16:creationId xmlns:a16="http://schemas.microsoft.com/office/drawing/2014/main" id="{C3037102-7C2A-48BA-B19A-E0AB7B0EF163}"/>
+                <a16:creationId xmlns:a16="http://schemas.microsoft.com/office/drawing/2014/main" id="{7DB5D056-2A03-4A1B-96E9-063C473433C7}"/>
               </a:ext>
             </a:extLst>
           </p:cNvPr>
-          <p:cNvSpPr>
-            <a:spLocks noGrp="1"/>
-          </p:cNvSpPr>
-          <p:nvPr>
-            <p:ph type="body" sz="quarter" idx="12"/>
-          </p:nvPr>
-        </p:nvSpPr>
-        <p:spPr/>
-        <p:txBody>
-          <a:bodyPr/>
-          <a:lstStyle/>
-          <a:p>
-            <a:r>
-              <a:rPr lang="pt-BR" dirty="0"/>
-              <a:t>Status </a:t>
-            </a:r>
-            <a:r>
-              <a:rPr lang="pt-BR" dirty="0" err="1"/>
-              <a:t>Report</a:t>
-            </a:r>
-            <a:r>
-              <a:rPr lang="pt-BR" dirty="0"/>
-              <a:t> do Projeto </a:t>
-            </a:r>
-          </a:p>
-          <a:p>
-            <a:r>
-              <a:rPr lang="pt-BR" dirty="0"/>
-              <a:t>&lt; 2Work &gt; </a:t>
-            </a:r>
-          </a:p>
-          <a:p>
-            <a:r>
-              <a:rPr lang="pt-BR" dirty="0"/>
-              <a:t>Data:  11/08/2021</a:t>
-            </a:r>
-          </a:p>
-          <a:p>
-            <a:r>
-              <a:rPr lang="pt-BR" dirty="0"/>
-              <a:t>&lt; Grupo 07 / 2Work &gt;</a:t>
-            </a:r>
-          </a:p>
-          <a:p>
-            <a:r>
-              <a:rPr lang="pt-BR" dirty="0"/>
-              <a:t>Professor.: Leonardo Marques</a:t>
-            </a:r>
-          </a:p>
-          <a:p>
-            <a:endParaRPr lang="pt-BR" dirty="0"/>
-          </a:p>
-        </p:txBody>
-      </p:sp>
+          <p:cNvPicPr>
+            <a:picLocks noChangeAspect="1"/>
+          </p:cNvPicPr>
+          <p:nvPr/>
+        </p:nvPicPr>
+        <p:blipFill>
+          <a:blip r:embed="rId2">
+            <a:extLst>
+              <a:ext uri="{28A0092B-C50C-407E-A947-70E740481C1C}">
+                <a14:useLocalDpi xmlns:a14="http://schemas.microsoft.com/office/drawing/2010/main" val="0"/>
+              </a:ext>
+            </a:extLst>
+          </a:blip>
+          <a:stretch>
+            <a:fillRect/>
+          </a:stretch>
+        </p:blipFill>
+        <p:spPr>
+          <a:xfrm>
+            <a:off x="0" y="0"/>
+            <a:ext cx="13442950" cy="7561263"/>
+          </a:xfrm>
+          <a:prstGeom prst="rect">
+            <a:avLst/>
+          </a:prstGeom>
+        </p:spPr>
+      </p:pic>
     </p:spTree>
     <p:extLst>
       <p:ext uri="{BB962C8B-B14F-4D97-AF65-F5344CB8AC3E}">
-        <p14:creationId xmlns:p14="http://schemas.microsoft.com/office/powerpoint/2010/main" val="948876888"/>
+        <p14:creationId xmlns:p14="http://schemas.microsoft.com/office/powerpoint/2010/main" val="500094798"/>
       </p:ext>
     </p:extLst>
   </p:cSld>
@@ -22779,7 +20592,7 @@
 </p:sld>
 </file>
 
-<file path=ppt/slides/slide3.xml><?xml version="1.0" encoding="utf-8"?>
+<file path=ppt/slides/slide2.xml><?xml version="1.0" encoding="utf-8"?>
 <p:sld xmlns:a="http://schemas.openxmlformats.org/drawingml/2006/main" xmlns:r="http://schemas.openxmlformats.org/officeDocument/2006/relationships" xmlns:p="http://schemas.openxmlformats.org/presentationml/2006/main">
   <p:cSld>
     <p:spTree>
@@ -25891,50 +23704,22 @@
 </a:theme>
 </file>
 
-<file path=ppt/theme/themeOverride1.xml><?xml version="1.0" encoding="utf-8"?>
-<a:themeOverride xmlns:a="http://schemas.openxmlformats.org/drawingml/2006/main">
-  <a:clrScheme name="Best">
-    <a:dk1>
-      <a:sysClr val="windowText" lastClr="000000"/>
-    </a:dk1>
-    <a:lt1>
-      <a:sysClr val="window" lastClr="FFFFFF"/>
-    </a:lt1>
-    <a:dk2>
-      <a:srgbClr val="253746"/>
-    </a:dk2>
-    <a:lt2>
-      <a:srgbClr val="EEECE1"/>
-    </a:lt2>
-    <a:accent1>
-      <a:srgbClr val="32B9CD"/>
-    </a:accent1>
-    <a:accent2>
-      <a:srgbClr val="CE0F69"/>
-    </a:accent2>
-    <a:accent3>
-      <a:srgbClr val="9BBB59"/>
-    </a:accent3>
-    <a:accent4>
-      <a:srgbClr val="292C34"/>
-    </a:accent4>
-    <a:accent5>
-      <a:srgbClr val="4BACC6"/>
-    </a:accent5>
-    <a:accent6>
-      <a:srgbClr val="F79646"/>
-    </a:accent6>
-    <a:hlink>
-      <a:srgbClr val="0000FF"/>
-    </a:hlink>
-    <a:folHlink>
-      <a:srgbClr val="800080"/>
-    </a:folHlink>
-  </a:clrScheme>
-</a:themeOverride>
+<file path=customXml/item1.xml><?xml version="1.0" encoding="utf-8"?>
+<?mso-contentType ?>
+<FormTemplates xmlns="http://schemas.microsoft.com/sharepoint/v3/contenttype/forms">
+  <Display>DocumentLibraryForm</Display>
+  <Edit>DocumentLibraryForm</Edit>
+  <New>DocumentLibraryForm</New>
+</FormTemplates>
 </file>
 
-<file path=customXml/item1.xml><?xml version="1.0" encoding="utf-8"?>
+<file path=customXml/item2.xml><?xml version="1.0" encoding="utf-8"?>
+<p:properties xmlns:p="http://schemas.microsoft.com/office/2006/metadata/properties" xmlns:xsi="http://www.w3.org/2001/XMLSchema-instance" xmlns:pc="http://schemas.microsoft.com/office/infopath/2007/PartnerControls">
+  <documentManagement/>
+</p:properties>
+</file>
+
+<file path=customXml/item3.xml><?xml version="1.0" encoding="utf-8"?>
 <ct:contentTypeSchema xmlns:ct="http://schemas.microsoft.com/office/2006/metadata/contentType" xmlns:ma="http://schemas.microsoft.com/office/2006/metadata/properties/metaAttributes" ct:_="" ma:_="" ma:contentTypeName="Document" ma:contentTypeID="0x0101007F8ECE7139958D46ABEDA89D12B90CBF" ma:contentTypeVersion="0" ma:contentTypeDescription="Create a new document." ma:contentTypeScope="" ma:versionID="e6d660081116f63565d30cc13099d5ec">
   <xsd:schema xmlns:xsd="http://www.w3.org/2001/XMLSchema" xmlns:xs="http://www.w3.org/2001/XMLSchema" xmlns:p="http://schemas.microsoft.com/office/2006/metadata/properties" targetNamespace="http://schemas.microsoft.com/office/2006/metadata/properties" ma:root="true" ma:fieldsID="d413257cd9829394d17656a545d5fa4e">
     <xsd:element name="properties">
@@ -26048,33 +23833,10 @@
 </ct:contentTypeSchema>
 </file>
 
-<file path=customXml/item2.xml><?xml version="1.0" encoding="utf-8"?>
-<p:properties xmlns:p="http://schemas.microsoft.com/office/2006/metadata/properties" xmlns:xsi="http://www.w3.org/2001/XMLSchema-instance" xmlns:pc="http://schemas.microsoft.com/office/infopath/2007/PartnerControls">
-  <documentManagement/>
-</p:properties>
-</file>
-
-<file path=customXml/item3.xml><?xml version="1.0" encoding="utf-8"?>
-<?mso-contentType ?>
-<FormTemplates xmlns="http://schemas.microsoft.com/sharepoint/v3/contenttype/forms">
-  <Display>DocumentLibraryForm</Display>
-  <Edit>DocumentLibraryForm</Edit>
-  <New>DocumentLibraryForm</New>
-</FormTemplates>
-</file>
-
 <file path=customXml/itemProps1.xml><?xml version="1.0" encoding="utf-8"?>
-<ds:datastoreItem xmlns:ds="http://schemas.openxmlformats.org/officeDocument/2006/customXml" ds:itemID="{EFDE92A4-5D2A-451A-A373-EB014CDC0D59}">
+<ds:datastoreItem xmlns:ds="http://schemas.openxmlformats.org/officeDocument/2006/customXml" ds:itemID="{E2481852-F24E-4532-AF30-C154D705D105}">
   <ds:schemaRefs>
-    <ds:schemaRef ds:uri="http://schemas.microsoft.com/office/2006/metadata/contentType"/>
-    <ds:schemaRef ds:uri="http://schemas.microsoft.com/office/2006/metadata/properties/metaAttributes"/>
-    <ds:schemaRef ds:uri="http://www.w3.org/2001/XMLSchema"/>
-    <ds:schemaRef ds:uri="http://schemas.microsoft.com/office/2006/metadata/properties"/>
-    <ds:schemaRef ds:uri="http://schemas.openxmlformats.org/package/2006/metadata/core-properties"/>
-    <ds:schemaRef ds:uri="http://purl.org/dc/elements/1.1/"/>
-    <ds:schemaRef ds:uri="http://purl.org/dc/terms/"/>
-    <ds:schemaRef ds:uri="http://schemas.microsoft.com/internal/obd"/>
-    <ds:schemaRef ds:uri="http://schemas.microsoft.com/office/infopath/2007/PartnerControls"/>
+    <ds:schemaRef ds:uri="http://schemas.microsoft.com/sharepoint/v3/contenttype/forms"/>
   </ds:schemaRefs>
 </ds:datastoreItem>
 </file>
@@ -26097,9 +23859,17 @@
 </file>
 
 <file path=customXml/itemProps3.xml><?xml version="1.0" encoding="utf-8"?>
-<ds:datastoreItem xmlns:ds="http://schemas.openxmlformats.org/officeDocument/2006/customXml" ds:itemID="{E2481852-F24E-4532-AF30-C154D705D105}">
+<ds:datastoreItem xmlns:ds="http://schemas.openxmlformats.org/officeDocument/2006/customXml" ds:itemID="{EFDE92A4-5D2A-451A-A373-EB014CDC0D59}">
   <ds:schemaRefs>
-    <ds:schemaRef ds:uri="http://schemas.microsoft.com/sharepoint/v3/contenttype/forms"/>
+    <ds:schemaRef ds:uri="http://schemas.microsoft.com/office/2006/metadata/contentType"/>
+    <ds:schemaRef ds:uri="http://schemas.microsoft.com/office/2006/metadata/properties/metaAttributes"/>
+    <ds:schemaRef ds:uri="http://www.w3.org/2001/XMLSchema"/>
+    <ds:schemaRef ds:uri="http://schemas.microsoft.com/office/2006/metadata/properties"/>
+    <ds:schemaRef ds:uri="http://schemas.openxmlformats.org/package/2006/metadata/core-properties"/>
+    <ds:schemaRef ds:uri="http://purl.org/dc/elements/1.1/"/>
+    <ds:schemaRef ds:uri="http://purl.org/dc/terms/"/>
+    <ds:schemaRef ds:uri="http://schemas.microsoft.com/internal/obd"/>
+    <ds:schemaRef ds:uri="http://schemas.microsoft.com/office/infopath/2007/PartnerControls"/>
   </ds:schemaRefs>
 </ds:datastoreItem>
 </file>
</xml_diff>